<commit_message>
Updated pptx: 'bus stops' -> 'tram and bus stops'
</commit_message>
<xml_diff>
--- a/presentation/TV-Tram.pptx
+++ b/presentation/TV-Tram.pptx
@@ -5664,7 +5664,19 @@
             </a:r>
             <a:r>
               <a:rPr lang="en-US" noProof="0" dirty="0" smtClean="0"/>
-              <a:t>: Use a television to display public transportation timetable for bus stops near the facility </a:t>
+              <a:t>: Use a television to display public transportation timetable for </a:t>
+            </a:r>
+            <a:r>
+              <a:rPr lang="pl-PL" noProof="0" smtClean="0"/>
+              <a:t>tram and </a:t>
+            </a:r>
+            <a:r>
+              <a:rPr lang="en-US" noProof="0" smtClean="0"/>
+              <a:t>bus </a:t>
+            </a:r>
+            <a:r>
+              <a:rPr lang="en-US" noProof="0" dirty="0" smtClean="0"/>
+              <a:t>stops near the facility </a:t>
             </a:r>
           </a:p>
           <a:p>
@@ -5683,16 +5695,8 @@
               <a:t>Description</a:t>
             </a:r>
             <a:r>
-              <a:rPr lang="en-US" noProof="0" smtClean="0"/>
-              <a:t>: </a:t>
-            </a:r>
-            <a:r>
-              <a:rPr lang="en-US" noProof="0" smtClean="0"/>
-              <a:t>TODO: copy </a:t>
-            </a:r>
-            <a:r>
               <a:rPr lang="en-US" noProof="0" dirty="0" smtClean="0"/>
-              <a:t>&amp; paste from </a:t>
+              <a:t>: TODO: copy &amp; paste from </a:t>
             </a:r>
             <a:r>
               <a:rPr lang="en-US" noProof="0" dirty="0" err="1" smtClean="0"/>
@@ -6995,6 +6999,23 @@
 </file>
 
 <file path=customXml/item1.xml><?xml version="1.0" encoding="utf-8"?>
+<p:properties xmlns:p="http://schemas.microsoft.com/office/2006/metadata/properties" xmlns:xsi="http://www.w3.org/2001/XMLSchema-instance">
+  <documentManagement>
+    <Data_x0020_Classification xmlns="9b4ca1ea-5fde-4d6d-bb12-7bca66b28d40">Private</Data_x0020_Classification>
+  </documentManagement>
+</p:properties>
+</file>
+
+<file path=customXml/item2.xml><?xml version="1.0" encoding="utf-8"?>
+<?mso-contentType ?>
+<FormTemplates xmlns="http://schemas.microsoft.com/sharepoint/v3/contenttype/forms">
+  <Display>DocumentLibraryForm</Display>
+  <Edit>DocumentLibraryForm</Edit>
+  <New>DocumentLibraryForm</New>
+</FormTemplates>
+</file>
+
+<file path=customXml/item3.xml><?xml version="1.0" encoding="utf-8"?>
 <ct:contentTypeSchema xmlns:ct="http://schemas.microsoft.com/office/2006/metadata/contentType" xmlns:ma="http://schemas.microsoft.com/office/2006/metadata/properties/metaAttributes" ct:_="" ma:_="" ma:contentTypeName="Document" ma:contentTypeID="0x010100DB5DA965ECAAD541B59145D8795FEC80" ma:contentTypeVersion="0" ma:contentTypeDescription="Create a new document." ma:contentTypeScope="" ma:versionID="206a14c534ac47e7d7e73873af344d96">
   <xsd:schema xmlns:xsd="http://www.w3.org/2001/XMLSchema" xmlns:p="http://schemas.microsoft.com/office/2006/metadata/properties" xmlns:ns2="9b4ca1ea-5fde-4d6d-bb12-7bca66b28d40" targetNamespace="http://schemas.microsoft.com/office/2006/metadata/properties" ma:root="true" ma:fieldsID="03bfca4280fcbdaf3123c8956d64ace9" ns2:_="">
     <xsd:import namespace="9b4ca1ea-5fde-4d6d-bb12-7bca66b28d40"/>
@@ -7058,24 +7079,30 @@
 </ct:contentTypeSchema>
 </file>
 
-<file path=customXml/item2.xml><?xml version="1.0" encoding="utf-8"?>
-<?mso-contentType ?>
-<FormTemplates xmlns="http://schemas.microsoft.com/sharepoint/v3/contenttype/forms">
-  <Display>DocumentLibraryForm</Display>
-  <Edit>DocumentLibraryForm</Edit>
-  <New>DocumentLibraryForm</New>
-</FormTemplates>
+<file path=customXml/itemProps1.xml><?xml version="1.0" encoding="utf-8"?>
+<ds:datastoreItem xmlns:ds="http://schemas.openxmlformats.org/officeDocument/2006/customXml" ds:itemID="{B952720F-F700-48FD-AFE9-F628657BBE4C}">
+  <ds:schemaRefs>
+    <ds:schemaRef ds:uri="http://purl.org/dc/dcmitype/"/>
+    <ds:schemaRef ds:uri="http://schemas.microsoft.com/office/2006/metadata/properties"/>
+    <ds:schemaRef ds:uri="http://schemas.microsoft.com/office/2006/documentManagement/types"/>
+    <ds:schemaRef ds:uri="http://www.w3.org/XML/1998/namespace"/>
+    <ds:schemaRef ds:uri="http://purl.org/dc/elements/1.1/"/>
+    <ds:schemaRef ds:uri="http://purl.org/dc/terms/"/>
+    <ds:schemaRef ds:uri="http://schemas.openxmlformats.org/package/2006/metadata/core-properties"/>
+    <ds:schemaRef ds:uri="9b4ca1ea-5fde-4d6d-bb12-7bca66b28d40"/>
+  </ds:schemaRefs>
+</ds:datastoreItem>
 </file>
 
-<file path=customXml/item3.xml><?xml version="1.0" encoding="utf-8"?>
-<p:properties xmlns:p="http://schemas.microsoft.com/office/2006/metadata/properties" xmlns:xsi="http://www.w3.org/2001/XMLSchema-instance">
-  <documentManagement>
-    <Data_x0020_Classification xmlns="9b4ca1ea-5fde-4d6d-bb12-7bca66b28d40">Private</Data_x0020_Classification>
-  </documentManagement>
-</p:properties>
+<file path=customXml/itemProps2.xml><?xml version="1.0" encoding="utf-8"?>
+<ds:datastoreItem xmlns:ds="http://schemas.openxmlformats.org/officeDocument/2006/customXml" ds:itemID="{980C73DB-1D69-49E7-A585-DEFFA75A31F5}">
+  <ds:schemaRefs>
+    <ds:schemaRef ds:uri="http://schemas.microsoft.com/sharepoint/v3/contenttype/forms"/>
+  </ds:schemaRefs>
+</ds:datastoreItem>
 </file>
 
-<file path=customXml/itemProps1.xml><?xml version="1.0" encoding="utf-8"?>
+<file path=customXml/itemProps3.xml><?xml version="1.0" encoding="utf-8"?>
 <ds:datastoreItem xmlns:ds="http://schemas.openxmlformats.org/officeDocument/2006/customXml" ds:itemID="{D640BD1A-3759-499B-B22B-EDE87723077F}">
   <ds:schemaRefs>
     <ds:schemaRef ds:uri="http://schemas.microsoft.com/office/2006/metadata/contentType"/>
@@ -7090,27 +7117,4 @@
     <ds:schemaRef ds:uri="http://schemas.microsoft.com/office/internal/2005/internalDocumentation"/>
   </ds:schemaRefs>
 </ds:datastoreItem>
-</file>
-
-<file path=customXml/itemProps2.xml><?xml version="1.0" encoding="utf-8"?>
-<ds:datastoreItem xmlns:ds="http://schemas.openxmlformats.org/officeDocument/2006/customXml" ds:itemID="{980C73DB-1D69-49E7-A585-DEFFA75A31F5}">
-  <ds:schemaRefs>
-    <ds:schemaRef ds:uri="http://schemas.microsoft.com/sharepoint/v3/contenttype/forms"/>
-  </ds:schemaRefs>
-</ds:datastoreItem>
-</file>
-
-<file path=customXml/itemProps3.xml><?xml version="1.0" encoding="utf-8"?>
-<ds:datastoreItem xmlns:ds="http://schemas.openxmlformats.org/officeDocument/2006/customXml" ds:itemID="{B952720F-F700-48FD-AFE9-F628657BBE4C}">
-  <ds:schemaRefs>
-    <ds:schemaRef ds:uri="http://purl.org/dc/dcmitype/"/>
-    <ds:schemaRef ds:uri="http://schemas.microsoft.com/office/2006/metadata/properties"/>
-    <ds:schemaRef ds:uri="http://schemas.microsoft.com/office/2006/documentManagement/types"/>
-    <ds:schemaRef ds:uri="http://www.w3.org/XML/1998/namespace"/>
-    <ds:schemaRef ds:uri="http://purl.org/dc/elements/1.1/"/>
-    <ds:schemaRef ds:uri="http://purl.org/dc/terms/"/>
-    <ds:schemaRef ds:uri="http://schemas.openxmlformats.org/package/2006/metadata/core-properties"/>
-    <ds:schemaRef ds:uri="9b4ca1ea-5fde-4d6d-bb12-7bca66b28d40"/>
-  </ds:schemaRefs>
-</ds:datastoreItem>
 </file>
</xml_diff>

<commit_message>
Final version for the presentation
</commit_message>
<xml_diff>
--- a/presentation/TV-Tram.pptx
+++ b/presentation/TV-Tram.pptx
@@ -5,14 +5,18 @@
     <p:sldMasterId id="2147483648" r:id="rId4"/>
   </p:sldMasterIdLst>
   <p:notesMasterIdLst>
-    <p:notesMasterId r:id="rId10"/>
+    <p:notesMasterId r:id="rId14"/>
   </p:notesMasterIdLst>
   <p:sldIdLst>
     <p:sldId id="256" r:id="rId5"/>
     <p:sldId id="257" r:id="rId6"/>
     <p:sldId id="260" r:id="rId7"/>
-    <p:sldId id="261" r:id="rId8"/>
-    <p:sldId id="259" r:id="rId9"/>
+    <p:sldId id="262" r:id="rId8"/>
+    <p:sldId id="261" r:id="rId9"/>
+    <p:sldId id="264" r:id="rId10"/>
+    <p:sldId id="263" r:id="rId11"/>
+    <p:sldId id="265" r:id="rId12"/>
+    <p:sldId id="259" r:id="rId13"/>
   </p:sldIdLst>
   <p:sldSz cx="9144000" cy="6858000" type="screen4x3"/>
   <p:notesSz cx="7010400" cy="9296400"/>
@@ -197,7 +201,7 @@
             <a:fld id="{16A2D87C-CCEB-4196-8AC6-AF7776F208D5}" type="datetimeFigureOut">
               <a:rPr lang="en-US" smtClean="0"/>
               <a:pPr/>
-              <a:t>6/20/2013</a:t>
+              <a:t>6/21/2013</a:t>
             </a:fld>
             <a:endParaRPr lang="en-US"/>
           </a:p>
@@ -768,7 +772,7 @@
       </p:sp>
       <p:pic>
         <p:nvPicPr>
-          <p:cNvPr id="9" name="Picture 8" descr="DRAFT.png"/>
+          <p:cNvPr id="11" name="Picture 10"/>
           <p:cNvPicPr>
             <a:picLocks noChangeAspect="1"/>
           </p:cNvPicPr>
@@ -776,32 +780,6 @@
         </p:nvPicPr>
         <p:blipFill>
           <a:blip r:embed="rId2" cstate="print">
-            <a:grayscl/>
-          </a:blip>
-          <a:stretch>
-            <a:fillRect/>
-          </a:stretch>
-        </p:blipFill>
-        <p:spPr>
-          <a:xfrm>
-            <a:off x="7136236" y="86550"/>
-            <a:ext cx="1899814" cy="430032"/>
-          </a:xfrm>
-          <a:prstGeom prst="rect">
-            <a:avLst/>
-          </a:prstGeom>
-        </p:spPr>
-      </p:pic>
-      <p:pic>
-        <p:nvPicPr>
-          <p:cNvPr id="11" name="Picture 10"/>
-          <p:cNvPicPr>
-            <a:picLocks noChangeAspect="1"/>
-          </p:cNvPicPr>
-          <p:nvPr userDrawn="1"/>
-        </p:nvPicPr>
-        <p:blipFill>
-          <a:blip r:embed="rId3" cstate="print">
             <a:extLst>
               <a:ext uri="{28A0092B-C50C-407E-A947-70E740481C1C}">
                 <a14:useLocalDpi xmlns:a14="http://schemas.microsoft.com/office/drawing/2010/main" val="0"/>
@@ -820,6 +798,101 @@
           <a:prstGeom prst="rect">
             <a:avLst/>
           </a:prstGeom>
+        </p:spPr>
+      </p:pic>
+      <p:pic>
+        <p:nvPicPr>
+          <p:cNvPr id="10" name="Picture 6"/>
+          <p:cNvPicPr>
+            <a:picLocks noChangeAspect="1" noChangeArrowheads="1"/>
+          </p:cNvPicPr>
+          <p:nvPr userDrawn="1"/>
+        </p:nvPicPr>
+        <p:blipFill>
+          <a:blip r:embed="rId3">
+            <a:extLst>
+              <a:ext uri="{BEBA8EAE-BF5A-486C-A8C5-ECC9F3942E4B}">
+                <a14:imgProps xmlns:a14="http://schemas.microsoft.com/office/drawing/2010/main">
+                  <a14:imgLayer r:embed="rId4">
+                    <a14:imgEffect>
+                      <a14:backgroundRemoval t="0" b="100000" l="0" r="100000">
+                        <a14:foregroundMark x1="46278" y1="68478" x2="46278" y2="76812"/>
+                        <a14:foregroundMark x1="49497" y1="59783" x2="51107" y2="70652"/>
+                        <a14:foregroundMark x1="61569" y1="67391" x2="64185" y2="77174"/>
+                        <a14:foregroundMark x1="84507" y1="71739" x2="81891" y2="87319"/>
+                        <a14:foregroundMark x1="5634" y1="11594" x2="7243" y2="16667"/>
+                        <a14:foregroundMark x1="36821" y1="25000" x2="43461" y2="31159"/>
+                        <a14:foregroundMark x1="60966" y1="23551" x2="54930" y2="38043"/>
+                        <a14:foregroundMark x1="31388" y1="18116" x2="43662" y2="17754"/>
+                        <a14:foregroundMark x1="47887" y1="25000" x2="43863" y2="17754"/>
+                        <a14:foregroundMark x1="51509" y1="25362" x2="55734" y2="17754"/>
+                        <a14:foregroundMark x1="55533" y1="18116" x2="68008" y2="18116"/>
+                        <a14:foregroundMark x1="68008" y1="18116" x2="72435" y2="24638"/>
+                        <a14:foregroundMark x1="26962" y1="25000" x2="31187" y2="17754"/>
+                        <a14:backgroundMark x1="26358" y1="72464" x2="26358" y2="72464"/>
+                        <a14:backgroundMark x1="5835" y1="53623" x2="32797" y2="85507"/>
+                        <a14:backgroundMark x1="23340" y1="9420" x2="25151" y2="40580"/>
+                        <a14:backgroundMark x1="91147" y1="3261" x2="88531" y2="12681"/>
+                        <a14:backgroundMark x1="91549" y1="70290" x2="95976" y2="89130"/>
+                        <a14:backgroundMark x1="73038" y1="33696" x2="74044" y2="53623"/>
+                        <a14:backgroundMark x1="55533" y1="97464" x2="70423" y2="97826"/>
+                        <a14:backgroundMark x1="70423" y1="73188" x2="70221" y2="83696"/>
+                      </a14:backgroundRemoval>
+                    </a14:imgEffect>
+                  </a14:imgLayer>
+                </a14:imgProps>
+              </a:ext>
+              <a:ext uri="{28A0092B-C50C-407E-A947-70E740481C1C}">
+                <a14:useLocalDpi xmlns:a14="http://schemas.microsoft.com/office/drawing/2010/main" val="0"/>
+              </a:ext>
+            </a:extLst>
+          </a:blip>
+          <a:srcRect/>
+          <a:stretch>
+            <a:fillRect/>
+          </a:stretch>
+        </p:blipFill>
+        <p:spPr bwMode="auto">
+          <a:xfrm>
+            <a:off x="6530200" y="0"/>
+            <a:ext cx="2613799" cy="1451526"/>
+          </a:xfrm>
+          <a:prstGeom prst="rect">
+            <a:avLst/>
+          </a:prstGeom>
+          <a:noFill/>
+          <a:ln>
+            <a:noFill/>
+          </a:ln>
+          <a:effectLst/>
+          <a:extLst>
+            <a:ext uri="{909E8E84-426E-40DD-AFC4-6F175D3DCCD1}">
+              <a14:hiddenFill xmlns:a14="http://schemas.microsoft.com/office/drawing/2010/main">
+                <a:solidFill>
+                  <a:schemeClr val="accent1"/>
+                </a:solidFill>
+              </a14:hiddenFill>
+            </a:ext>
+            <a:ext uri="{91240B29-F687-4F45-9708-019B960494DF}">
+              <a14:hiddenLine xmlns:a14="http://schemas.microsoft.com/office/drawing/2010/main" w="9525">
+                <a:solidFill>
+                  <a:schemeClr val="tx1"/>
+                </a:solidFill>
+                <a:miter lim="800000"/>
+                <a:headEnd/>
+                <a:tailEnd/>
+              </a14:hiddenLine>
+            </a:ext>
+            <a:ext uri="{AF507438-7753-43E0-B8FC-AC1667EBCBE1}">
+              <a14:hiddenEffects xmlns:a14="http://schemas.microsoft.com/office/drawing/2010/main">
+                <a:effectLst>
+                  <a:outerShdw dist="35921" dir="2700000" algn="ctr" rotWithShape="0">
+                    <a:schemeClr val="bg2"/>
+                  </a:outerShdw>
+                </a:effectLst>
+              </a14:hiddenEffects>
+            </a:ext>
+          </a:extLst>
         </p:spPr>
       </p:pic>
     </p:spTree>
@@ -1061,28 +1134,97 @@
       </p:cxnSp>
       <p:pic>
         <p:nvPicPr>
-          <p:cNvPr id="11" name="Picture 10" descr="DRAFT.png"/>
+          <p:cNvPr id="12" name="Picture 6"/>
           <p:cNvPicPr>
-            <a:picLocks noChangeAspect="1"/>
+            <a:picLocks noChangeAspect="1" noChangeArrowheads="1"/>
           </p:cNvPicPr>
           <p:nvPr userDrawn="1"/>
         </p:nvPicPr>
         <p:blipFill>
           <a:blip r:embed="rId3" cstate="print">
-            <a:grayscl/>
+            <a:extLst>
+              <a:ext uri="{BEBA8EAE-BF5A-486C-A8C5-ECC9F3942E4B}">
+                <a14:imgProps xmlns:a14="http://schemas.microsoft.com/office/drawing/2010/main">
+                  <a14:imgLayer r:embed="rId4">
+                    <a14:imgEffect>
+                      <a14:backgroundRemoval t="0" b="100000" l="0" r="100000">
+                        <a14:foregroundMark x1="46278" y1="68478" x2="46278" y2="76812"/>
+                        <a14:foregroundMark x1="49497" y1="59783" x2="51107" y2="70652"/>
+                        <a14:foregroundMark x1="61569" y1="67391" x2="64185" y2="77174"/>
+                        <a14:foregroundMark x1="84507" y1="71739" x2="81891" y2="87319"/>
+                        <a14:foregroundMark x1="5634" y1="11594" x2="7243" y2="16667"/>
+                        <a14:foregroundMark x1="36821" y1="25000" x2="43461" y2="31159"/>
+                        <a14:foregroundMark x1="60966" y1="23551" x2="54930" y2="38043"/>
+                        <a14:foregroundMark x1="31388" y1="18116" x2="43662" y2="17754"/>
+                        <a14:foregroundMark x1="47887" y1="25000" x2="43863" y2="17754"/>
+                        <a14:foregroundMark x1="51509" y1="25362" x2="55734" y2="17754"/>
+                        <a14:foregroundMark x1="55533" y1="18116" x2="68008" y2="18116"/>
+                        <a14:foregroundMark x1="68008" y1="18116" x2="72435" y2="24638"/>
+                        <a14:foregroundMark x1="26962" y1="25000" x2="31187" y2="17754"/>
+                        <a14:backgroundMark x1="26358" y1="72464" x2="26358" y2="72464"/>
+                        <a14:backgroundMark x1="5835" y1="53623" x2="32797" y2="85507"/>
+                        <a14:backgroundMark x1="23340" y1="9420" x2="25151" y2="40580"/>
+                        <a14:backgroundMark x1="91147" y1="3261" x2="88531" y2="12681"/>
+                        <a14:backgroundMark x1="91549" y1="70290" x2="95976" y2="89130"/>
+                        <a14:backgroundMark x1="73038" y1="33696" x2="74044" y2="53623"/>
+                        <a14:backgroundMark x1="55533" y1="97464" x2="70423" y2="97826"/>
+                        <a14:backgroundMark x1="70423" y1="73188" x2="70221" y2="83696"/>
+                      </a14:backgroundRemoval>
+                    </a14:imgEffect>
+                  </a14:imgLayer>
+                </a14:imgProps>
+              </a:ext>
+              <a:ext uri="{28A0092B-C50C-407E-A947-70E740481C1C}">
+                <a14:useLocalDpi xmlns:a14="http://schemas.microsoft.com/office/drawing/2010/main" val="0"/>
+              </a:ext>
+            </a:extLst>
           </a:blip>
+          <a:srcRect/>
           <a:stretch>
             <a:fillRect/>
           </a:stretch>
         </p:blipFill>
-        <p:spPr>
-          <a:xfrm>
-            <a:off x="7136236" y="86550"/>
-            <a:ext cx="1899814" cy="430032"/>
+        <p:spPr bwMode="auto">
+          <a:xfrm>
+            <a:off x="7139704" y="1"/>
+            <a:ext cx="2012488" cy="1117599"/>
           </a:xfrm>
           <a:prstGeom prst="rect">
             <a:avLst/>
           </a:prstGeom>
+          <a:noFill/>
+          <a:ln>
+            <a:noFill/>
+          </a:ln>
+          <a:effectLst/>
+          <a:extLst>
+            <a:ext uri="{909E8E84-426E-40DD-AFC4-6F175D3DCCD1}">
+              <a14:hiddenFill xmlns:a14="http://schemas.microsoft.com/office/drawing/2010/main">
+                <a:solidFill>
+                  <a:schemeClr val="accent1"/>
+                </a:solidFill>
+              </a14:hiddenFill>
+            </a:ext>
+            <a:ext uri="{91240B29-F687-4F45-9708-019B960494DF}">
+              <a14:hiddenLine xmlns:a14="http://schemas.microsoft.com/office/drawing/2010/main" w="9525">
+                <a:solidFill>
+                  <a:schemeClr val="tx1"/>
+                </a:solidFill>
+                <a:miter lim="800000"/>
+                <a:headEnd/>
+                <a:tailEnd/>
+              </a14:hiddenLine>
+            </a:ext>
+            <a:ext uri="{AF507438-7753-43E0-B8FC-AC1667EBCBE1}">
+              <a14:hiddenEffects xmlns:a14="http://schemas.microsoft.com/office/drawing/2010/main">
+                <a:effectLst>
+                  <a:outerShdw dist="35921" dir="2700000" algn="ctr" rotWithShape="0">
+                    <a:schemeClr val="bg2"/>
+                  </a:outerShdw>
+                </a:effectLst>
+              </a14:hiddenEffects>
+            </a:ext>
+          </a:extLst>
         </p:spPr>
       </p:pic>
     </p:spTree>
@@ -1328,28 +1470,97 @@
       </p:sp>
       <p:pic>
         <p:nvPicPr>
-          <p:cNvPr id="10" name="Picture 9" descr="DRAFT.png"/>
+          <p:cNvPr id="12" name="Picture 6"/>
           <p:cNvPicPr>
-            <a:picLocks noChangeAspect="1"/>
+            <a:picLocks noChangeAspect="1" noChangeArrowheads="1"/>
           </p:cNvPicPr>
           <p:nvPr userDrawn="1"/>
         </p:nvPicPr>
         <p:blipFill>
           <a:blip r:embed="rId3" cstate="print">
-            <a:lum bright="70000" contrast="-70000"/>
+            <a:extLst>
+              <a:ext uri="{BEBA8EAE-BF5A-486C-A8C5-ECC9F3942E4B}">
+                <a14:imgProps xmlns:a14="http://schemas.microsoft.com/office/drawing/2010/main">
+                  <a14:imgLayer r:embed="rId4">
+                    <a14:imgEffect>
+                      <a14:backgroundRemoval t="0" b="100000" l="0" r="100000">
+                        <a14:foregroundMark x1="46278" y1="68478" x2="46278" y2="76812"/>
+                        <a14:foregroundMark x1="49497" y1="59783" x2="51107" y2="70652"/>
+                        <a14:foregroundMark x1="61569" y1="67391" x2="64185" y2="77174"/>
+                        <a14:foregroundMark x1="84507" y1="71739" x2="81891" y2="87319"/>
+                        <a14:foregroundMark x1="5634" y1="11594" x2="7243" y2="16667"/>
+                        <a14:foregroundMark x1="36821" y1="25000" x2="43461" y2="31159"/>
+                        <a14:foregroundMark x1="60966" y1="23551" x2="54930" y2="38043"/>
+                        <a14:foregroundMark x1="31388" y1="18116" x2="43662" y2="17754"/>
+                        <a14:foregroundMark x1="47887" y1="25000" x2="43863" y2="17754"/>
+                        <a14:foregroundMark x1="51509" y1="25362" x2="55734" y2="17754"/>
+                        <a14:foregroundMark x1="55533" y1="18116" x2="68008" y2="18116"/>
+                        <a14:foregroundMark x1="68008" y1="18116" x2="72435" y2="24638"/>
+                        <a14:foregroundMark x1="26962" y1="25000" x2="31187" y2="17754"/>
+                        <a14:backgroundMark x1="26358" y1="72464" x2="26358" y2="72464"/>
+                        <a14:backgroundMark x1="5835" y1="53623" x2="32797" y2="85507"/>
+                        <a14:backgroundMark x1="23340" y1="9420" x2="25151" y2="40580"/>
+                        <a14:backgroundMark x1="91147" y1="3261" x2="88531" y2="12681"/>
+                        <a14:backgroundMark x1="91549" y1="70290" x2="95976" y2="89130"/>
+                        <a14:backgroundMark x1="73038" y1="33696" x2="74044" y2="53623"/>
+                        <a14:backgroundMark x1="55533" y1="97464" x2="70423" y2="97826"/>
+                        <a14:backgroundMark x1="70423" y1="73188" x2="70221" y2="83696"/>
+                      </a14:backgroundRemoval>
+                    </a14:imgEffect>
+                  </a14:imgLayer>
+                </a14:imgProps>
+              </a:ext>
+              <a:ext uri="{28A0092B-C50C-407E-A947-70E740481C1C}">
+                <a14:useLocalDpi xmlns:a14="http://schemas.microsoft.com/office/drawing/2010/main" val="0"/>
+              </a:ext>
+            </a:extLst>
           </a:blip>
+          <a:srcRect/>
           <a:stretch>
             <a:fillRect/>
           </a:stretch>
         </p:blipFill>
-        <p:spPr>
-          <a:xfrm>
-            <a:off x="7136236" y="86550"/>
-            <a:ext cx="1899814" cy="430032"/>
+        <p:spPr bwMode="auto">
+          <a:xfrm>
+            <a:off x="7139704" y="1"/>
+            <a:ext cx="2012488" cy="1117599"/>
           </a:xfrm>
           <a:prstGeom prst="rect">
             <a:avLst/>
           </a:prstGeom>
+          <a:noFill/>
+          <a:ln>
+            <a:noFill/>
+          </a:ln>
+          <a:effectLst/>
+          <a:extLst>
+            <a:ext uri="{909E8E84-426E-40DD-AFC4-6F175D3DCCD1}">
+              <a14:hiddenFill xmlns:a14="http://schemas.microsoft.com/office/drawing/2010/main">
+                <a:solidFill>
+                  <a:schemeClr val="accent1"/>
+                </a:solidFill>
+              </a14:hiddenFill>
+            </a:ext>
+            <a:ext uri="{91240B29-F687-4F45-9708-019B960494DF}">
+              <a14:hiddenLine xmlns:a14="http://schemas.microsoft.com/office/drawing/2010/main" w="9525">
+                <a:solidFill>
+                  <a:schemeClr val="tx1"/>
+                </a:solidFill>
+                <a:miter lim="800000"/>
+                <a:headEnd/>
+                <a:tailEnd/>
+              </a14:hiddenLine>
+            </a:ext>
+            <a:ext uri="{AF507438-7753-43E0-B8FC-AC1667EBCBE1}">
+              <a14:hiddenEffects xmlns:a14="http://schemas.microsoft.com/office/drawing/2010/main">
+                <a:effectLst>
+                  <a:outerShdw dist="35921" dir="2700000" algn="ctr" rotWithShape="0">
+                    <a:schemeClr val="bg2"/>
+                  </a:outerShdw>
+                </a:effectLst>
+              </a14:hiddenEffects>
+            </a:ext>
+          </a:extLst>
         </p:spPr>
       </p:pic>
     </p:spTree>
@@ -1468,28 +1679,97 @@
       </p:sp>
       <p:pic>
         <p:nvPicPr>
-          <p:cNvPr id="6" name="Picture 5" descr="DRAFT.png"/>
+          <p:cNvPr id="8" name="Picture 6"/>
           <p:cNvPicPr>
-            <a:picLocks noChangeAspect="1"/>
+            <a:picLocks noChangeAspect="1" noChangeArrowheads="1"/>
           </p:cNvPicPr>
           <p:nvPr userDrawn="1"/>
         </p:nvPicPr>
         <p:blipFill>
           <a:blip r:embed="rId2" cstate="print">
-            <a:grayscl/>
+            <a:extLst>
+              <a:ext uri="{BEBA8EAE-BF5A-486C-A8C5-ECC9F3942E4B}">
+                <a14:imgProps xmlns:a14="http://schemas.microsoft.com/office/drawing/2010/main">
+                  <a14:imgLayer r:embed="rId3">
+                    <a14:imgEffect>
+                      <a14:backgroundRemoval t="0" b="100000" l="0" r="100000">
+                        <a14:foregroundMark x1="46278" y1="68478" x2="46278" y2="76812"/>
+                        <a14:foregroundMark x1="49497" y1="59783" x2="51107" y2="70652"/>
+                        <a14:foregroundMark x1="61569" y1="67391" x2="64185" y2="77174"/>
+                        <a14:foregroundMark x1="84507" y1="71739" x2="81891" y2="87319"/>
+                        <a14:foregroundMark x1="5634" y1="11594" x2="7243" y2="16667"/>
+                        <a14:foregroundMark x1="36821" y1="25000" x2="43461" y2="31159"/>
+                        <a14:foregroundMark x1="60966" y1="23551" x2="54930" y2="38043"/>
+                        <a14:foregroundMark x1="31388" y1="18116" x2="43662" y2="17754"/>
+                        <a14:foregroundMark x1="47887" y1="25000" x2="43863" y2="17754"/>
+                        <a14:foregroundMark x1="51509" y1="25362" x2="55734" y2="17754"/>
+                        <a14:foregroundMark x1="55533" y1="18116" x2="68008" y2="18116"/>
+                        <a14:foregroundMark x1="68008" y1="18116" x2="72435" y2="24638"/>
+                        <a14:foregroundMark x1="26962" y1="25000" x2="31187" y2="17754"/>
+                        <a14:backgroundMark x1="26358" y1="72464" x2="26358" y2="72464"/>
+                        <a14:backgroundMark x1="5835" y1="53623" x2="32797" y2="85507"/>
+                        <a14:backgroundMark x1="23340" y1="9420" x2="25151" y2="40580"/>
+                        <a14:backgroundMark x1="91147" y1="3261" x2="88531" y2="12681"/>
+                        <a14:backgroundMark x1="91549" y1="70290" x2="95976" y2="89130"/>
+                        <a14:backgroundMark x1="73038" y1="33696" x2="74044" y2="53623"/>
+                        <a14:backgroundMark x1="55533" y1="97464" x2="70423" y2="97826"/>
+                        <a14:backgroundMark x1="70423" y1="73188" x2="70221" y2="83696"/>
+                      </a14:backgroundRemoval>
+                    </a14:imgEffect>
+                  </a14:imgLayer>
+                </a14:imgProps>
+              </a:ext>
+              <a:ext uri="{28A0092B-C50C-407E-A947-70E740481C1C}">
+                <a14:useLocalDpi xmlns:a14="http://schemas.microsoft.com/office/drawing/2010/main" val="0"/>
+              </a:ext>
+            </a:extLst>
           </a:blip>
+          <a:srcRect/>
           <a:stretch>
             <a:fillRect/>
           </a:stretch>
         </p:blipFill>
-        <p:spPr>
-          <a:xfrm>
-            <a:off x="7136236" y="86550"/>
-            <a:ext cx="1899814" cy="430032"/>
+        <p:spPr bwMode="auto">
+          <a:xfrm>
+            <a:off x="7139704" y="1"/>
+            <a:ext cx="2012488" cy="1117599"/>
           </a:xfrm>
           <a:prstGeom prst="rect">
             <a:avLst/>
           </a:prstGeom>
+          <a:noFill/>
+          <a:ln>
+            <a:noFill/>
+          </a:ln>
+          <a:effectLst/>
+          <a:extLst>
+            <a:ext uri="{909E8E84-426E-40DD-AFC4-6F175D3DCCD1}">
+              <a14:hiddenFill xmlns:a14="http://schemas.microsoft.com/office/drawing/2010/main">
+                <a:solidFill>
+                  <a:schemeClr val="accent1"/>
+                </a:solidFill>
+              </a14:hiddenFill>
+            </a:ext>
+            <a:ext uri="{91240B29-F687-4F45-9708-019B960494DF}">
+              <a14:hiddenLine xmlns:a14="http://schemas.microsoft.com/office/drawing/2010/main" w="9525">
+                <a:solidFill>
+                  <a:schemeClr val="tx1"/>
+                </a:solidFill>
+                <a:miter lim="800000"/>
+                <a:headEnd/>
+                <a:tailEnd/>
+              </a14:hiddenLine>
+            </a:ext>
+            <a:ext uri="{AF507438-7753-43E0-B8FC-AC1667EBCBE1}">
+              <a14:hiddenEffects xmlns:a14="http://schemas.microsoft.com/office/drawing/2010/main">
+                <a:effectLst>
+                  <a:outerShdw dist="35921" dir="2700000" algn="ctr" rotWithShape="0">
+                    <a:schemeClr val="bg2"/>
+                  </a:outerShdw>
+                </a:effectLst>
+              </a14:hiddenEffects>
+            </a:ext>
+          </a:extLst>
         </p:spPr>
       </p:pic>
     </p:spTree>
@@ -1796,28 +2076,97 @@
       </p:cxnSp>
       <p:pic>
         <p:nvPicPr>
-          <p:cNvPr id="12" name="Picture 11" descr="DRAFT.png"/>
+          <p:cNvPr id="13" name="Picture 6"/>
           <p:cNvPicPr>
-            <a:picLocks noChangeAspect="1"/>
+            <a:picLocks noChangeAspect="1" noChangeArrowheads="1"/>
           </p:cNvPicPr>
           <p:nvPr userDrawn="1"/>
         </p:nvPicPr>
         <p:blipFill>
           <a:blip r:embed="rId3" cstate="print">
-            <a:grayscl/>
+            <a:extLst>
+              <a:ext uri="{BEBA8EAE-BF5A-486C-A8C5-ECC9F3942E4B}">
+                <a14:imgProps xmlns:a14="http://schemas.microsoft.com/office/drawing/2010/main">
+                  <a14:imgLayer r:embed="rId4">
+                    <a14:imgEffect>
+                      <a14:backgroundRemoval t="0" b="100000" l="0" r="100000">
+                        <a14:foregroundMark x1="46278" y1="68478" x2="46278" y2="76812"/>
+                        <a14:foregroundMark x1="49497" y1="59783" x2="51107" y2="70652"/>
+                        <a14:foregroundMark x1="61569" y1="67391" x2="64185" y2="77174"/>
+                        <a14:foregroundMark x1="84507" y1="71739" x2="81891" y2="87319"/>
+                        <a14:foregroundMark x1="5634" y1="11594" x2="7243" y2="16667"/>
+                        <a14:foregroundMark x1="36821" y1="25000" x2="43461" y2="31159"/>
+                        <a14:foregroundMark x1="60966" y1="23551" x2="54930" y2="38043"/>
+                        <a14:foregroundMark x1="31388" y1="18116" x2="43662" y2="17754"/>
+                        <a14:foregroundMark x1="47887" y1="25000" x2="43863" y2="17754"/>
+                        <a14:foregroundMark x1="51509" y1="25362" x2="55734" y2="17754"/>
+                        <a14:foregroundMark x1="55533" y1="18116" x2="68008" y2="18116"/>
+                        <a14:foregroundMark x1="68008" y1="18116" x2="72435" y2="24638"/>
+                        <a14:foregroundMark x1="26962" y1="25000" x2="31187" y2="17754"/>
+                        <a14:backgroundMark x1="26358" y1="72464" x2="26358" y2="72464"/>
+                        <a14:backgroundMark x1="5835" y1="53623" x2="32797" y2="85507"/>
+                        <a14:backgroundMark x1="23340" y1="9420" x2="25151" y2="40580"/>
+                        <a14:backgroundMark x1="91147" y1="3261" x2="88531" y2="12681"/>
+                        <a14:backgroundMark x1="91549" y1="70290" x2="95976" y2="89130"/>
+                        <a14:backgroundMark x1="73038" y1="33696" x2="74044" y2="53623"/>
+                        <a14:backgroundMark x1="55533" y1="97464" x2="70423" y2="97826"/>
+                        <a14:backgroundMark x1="70423" y1="73188" x2="70221" y2="83696"/>
+                      </a14:backgroundRemoval>
+                    </a14:imgEffect>
+                  </a14:imgLayer>
+                </a14:imgProps>
+              </a:ext>
+              <a:ext uri="{28A0092B-C50C-407E-A947-70E740481C1C}">
+                <a14:useLocalDpi xmlns:a14="http://schemas.microsoft.com/office/drawing/2010/main" val="0"/>
+              </a:ext>
+            </a:extLst>
           </a:blip>
+          <a:srcRect/>
           <a:stretch>
             <a:fillRect/>
           </a:stretch>
         </p:blipFill>
-        <p:spPr>
-          <a:xfrm>
-            <a:off x="7136236" y="86550"/>
-            <a:ext cx="1899814" cy="430032"/>
+        <p:spPr bwMode="auto">
+          <a:xfrm>
+            <a:off x="7139704" y="1"/>
+            <a:ext cx="2012488" cy="1117599"/>
           </a:xfrm>
           <a:prstGeom prst="rect">
             <a:avLst/>
           </a:prstGeom>
+          <a:noFill/>
+          <a:ln>
+            <a:noFill/>
+          </a:ln>
+          <a:effectLst/>
+          <a:extLst>
+            <a:ext uri="{909E8E84-426E-40DD-AFC4-6F175D3DCCD1}">
+              <a14:hiddenFill xmlns:a14="http://schemas.microsoft.com/office/drawing/2010/main">
+                <a:solidFill>
+                  <a:schemeClr val="accent1"/>
+                </a:solidFill>
+              </a14:hiddenFill>
+            </a:ext>
+            <a:ext uri="{91240B29-F687-4F45-9708-019B960494DF}">
+              <a14:hiddenLine xmlns:a14="http://schemas.microsoft.com/office/drawing/2010/main" w="9525">
+                <a:solidFill>
+                  <a:schemeClr val="tx1"/>
+                </a:solidFill>
+                <a:miter lim="800000"/>
+                <a:headEnd/>
+                <a:tailEnd/>
+              </a14:hiddenLine>
+            </a:ext>
+            <a:ext uri="{AF507438-7753-43E0-B8FC-AC1667EBCBE1}">
+              <a14:hiddenEffects xmlns:a14="http://schemas.microsoft.com/office/drawing/2010/main">
+                <a:effectLst>
+                  <a:outerShdw dist="35921" dir="2700000" algn="ctr" rotWithShape="0">
+                    <a:schemeClr val="bg2"/>
+                  </a:outerShdw>
+                </a:effectLst>
+              </a14:hiddenEffects>
+            </a:ext>
+          </a:extLst>
         </p:spPr>
       </p:pic>
     </p:spTree>
@@ -2133,28 +2482,97 @@
       </p:sp>
       <p:pic>
         <p:nvPicPr>
-          <p:cNvPr id="11" name="Picture 10" descr="DRAFT.png"/>
+          <p:cNvPr id="13" name="Picture 6"/>
           <p:cNvPicPr>
-            <a:picLocks noChangeAspect="1"/>
+            <a:picLocks noChangeAspect="1" noChangeArrowheads="1"/>
           </p:cNvPicPr>
           <p:nvPr userDrawn="1"/>
         </p:nvPicPr>
         <p:blipFill>
           <a:blip r:embed="rId3" cstate="print">
-            <a:lum bright="70000" contrast="-70000"/>
+            <a:extLst>
+              <a:ext uri="{BEBA8EAE-BF5A-486C-A8C5-ECC9F3942E4B}">
+                <a14:imgProps xmlns:a14="http://schemas.microsoft.com/office/drawing/2010/main">
+                  <a14:imgLayer r:embed="rId4">
+                    <a14:imgEffect>
+                      <a14:backgroundRemoval t="0" b="100000" l="0" r="100000">
+                        <a14:foregroundMark x1="46278" y1="68478" x2="46278" y2="76812"/>
+                        <a14:foregroundMark x1="49497" y1="59783" x2="51107" y2="70652"/>
+                        <a14:foregroundMark x1="61569" y1="67391" x2="64185" y2="77174"/>
+                        <a14:foregroundMark x1="84507" y1="71739" x2="81891" y2="87319"/>
+                        <a14:foregroundMark x1="5634" y1="11594" x2="7243" y2="16667"/>
+                        <a14:foregroundMark x1="36821" y1="25000" x2="43461" y2="31159"/>
+                        <a14:foregroundMark x1="60966" y1="23551" x2="54930" y2="38043"/>
+                        <a14:foregroundMark x1="31388" y1="18116" x2="43662" y2="17754"/>
+                        <a14:foregroundMark x1="47887" y1="25000" x2="43863" y2="17754"/>
+                        <a14:foregroundMark x1="51509" y1="25362" x2="55734" y2="17754"/>
+                        <a14:foregroundMark x1="55533" y1="18116" x2="68008" y2="18116"/>
+                        <a14:foregroundMark x1="68008" y1="18116" x2="72435" y2="24638"/>
+                        <a14:foregroundMark x1="26962" y1="25000" x2="31187" y2="17754"/>
+                        <a14:backgroundMark x1="26358" y1="72464" x2="26358" y2="72464"/>
+                        <a14:backgroundMark x1="5835" y1="53623" x2="32797" y2="85507"/>
+                        <a14:backgroundMark x1="23340" y1="9420" x2="25151" y2="40580"/>
+                        <a14:backgroundMark x1="91147" y1="3261" x2="88531" y2="12681"/>
+                        <a14:backgroundMark x1="91549" y1="70290" x2="95976" y2="89130"/>
+                        <a14:backgroundMark x1="73038" y1="33696" x2="74044" y2="53623"/>
+                        <a14:backgroundMark x1="55533" y1="97464" x2="70423" y2="97826"/>
+                        <a14:backgroundMark x1="70423" y1="73188" x2="70221" y2="83696"/>
+                      </a14:backgroundRemoval>
+                    </a14:imgEffect>
+                  </a14:imgLayer>
+                </a14:imgProps>
+              </a:ext>
+              <a:ext uri="{28A0092B-C50C-407E-A947-70E740481C1C}">
+                <a14:useLocalDpi xmlns:a14="http://schemas.microsoft.com/office/drawing/2010/main" val="0"/>
+              </a:ext>
+            </a:extLst>
           </a:blip>
+          <a:srcRect/>
           <a:stretch>
             <a:fillRect/>
           </a:stretch>
         </p:blipFill>
-        <p:spPr>
-          <a:xfrm>
-            <a:off x="7136236" y="86550"/>
-            <a:ext cx="1899814" cy="430032"/>
+        <p:spPr bwMode="auto">
+          <a:xfrm>
+            <a:off x="7139704" y="1"/>
+            <a:ext cx="2012488" cy="1117599"/>
           </a:xfrm>
           <a:prstGeom prst="rect">
             <a:avLst/>
           </a:prstGeom>
+          <a:noFill/>
+          <a:ln>
+            <a:noFill/>
+          </a:ln>
+          <a:effectLst/>
+          <a:extLst>
+            <a:ext uri="{909E8E84-426E-40DD-AFC4-6F175D3DCCD1}">
+              <a14:hiddenFill xmlns:a14="http://schemas.microsoft.com/office/drawing/2010/main">
+                <a:solidFill>
+                  <a:schemeClr val="accent1"/>
+                </a:solidFill>
+              </a14:hiddenFill>
+            </a:ext>
+            <a:ext uri="{91240B29-F687-4F45-9708-019B960494DF}">
+              <a14:hiddenLine xmlns:a14="http://schemas.microsoft.com/office/drawing/2010/main" w="9525">
+                <a:solidFill>
+                  <a:schemeClr val="tx1"/>
+                </a:solidFill>
+                <a:miter lim="800000"/>
+                <a:headEnd/>
+                <a:tailEnd/>
+              </a14:hiddenLine>
+            </a:ext>
+            <a:ext uri="{AF507438-7753-43E0-B8FC-AC1667EBCBE1}">
+              <a14:hiddenEffects xmlns:a14="http://schemas.microsoft.com/office/drawing/2010/main">
+                <a:effectLst>
+                  <a:outerShdw dist="35921" dir="2700000" algn="ctr" rotWithShape="0">
+                    <a:schemeClr val="bg2"/>
+                  </a:outerShdw>
+                </a:effectLst>
+              </a14:hiddenEffects>
+            </a:ext>
+          </a:extLst>
         </p:spPr>
       </p:pic>
     </p:spTree>
@@ -2435,7 +2853,7 @@
       </p:sp>
       <p:pic>
         <p:nvPicPr>
-          <p:cNvPr id="13" name="Picture 12" descr="DRAFT.png"/>
+          <p:cNvPr id="9" name="Picture 8"/>
           <p:cNvPicPr>
             <a:picLocks noChangeAspect="1"/>
           </p:cNvPicPr>
@@ -2443,32 +2861,6 @@
         </p:nvPicPr>
         <p:blipFill>
           <a:blip r:embed="rId2" cstate="print">
-            <a:grayscl/>
-          </a:blip>
-          <a:stretch>
-            <a:fillRect/>
-          </a:stretch>
-        </p:blipFill>
-        <p:spPr>
-          <a:xfrm>
-            <a:off x="7136236" y="86550"/>
-            <a:ext cx="1899814" cy="430032"/>
-          </a:xfrm>
-          <a:prstGeom prst="rect">
-            <a:avLst/>
-          </a:prstGeom>
-        </p:spPr>
-      </p:pic>
-      <p:pic>
-        <p:nvPicPr>
-          <p:cNvPr id="9" name="Picture 8"/>
-          <p:cNvPicPr>
-            <a:picLocks noChangeAspect="1"/>
-          </p:cNvPicPr>
-          <p:nvPr userDrawn="1"/>
-        </p:nvPicPr>
-        <p:blipFill>
-          <a:blip r:embed="rId3" cstate="print">
             <a:extLst>
               <a:ext uri="{28A0092B-C50C-407E-A947-70E740481C1C}">
                 <a14:useLocalDpi xmlns:a14="http://schemas.microsoft.com/office/drawing/2010/main" val="0"/>
@@ -2487,6 +2879,101 @@
           <a:prstGeom prst="rect">
             <a:avLst/>
           </a:prstGeom>
+        </p:spPr>
+      </p:pic>
+      <p:pic>
+        <p:nvPicPr>
+          <p:cNvPr id="11" name="Picture 6"/>
+          <p:cNvPicPr>
+            <a:picLocks noChangeAspect="1" noChangeArrowheads="1"/>
+          </p:cNvPicPr>
+          <p:nvPr userDrawn="1"/>
+        </p:nvPicPr>
+        <p:blipFill>
+          <a:blip r:embed="rId3" cstate="print">
+            <a:extLst>
+              <a:ext uri="{BEBA8EAE-BF5A-486C-A8C5-ECC9F3942E4B}">
+                <a14:imgProps xmlns:a14="http://schemas.microsoft.com/office/drawing/2010/main">
+                  <a14:imgLayer r:embed="rId4">
+                    <a14:imgEffect>
+                      <a14:backgroundRemoval t="0" b="100000" l="0" r="100000">
+                        <a14:foregroundMark x1="46278" y1="68478" x2="46278" y2="76812"/>
+                        <a14:foregroundMark x1="49497" y1="59783" x2="51107" y2="70652"/>
+                        <a14:foregroundMark x1="61569" y1="67391" x2="64185" y2="77174"/>
+                        <a14:foregroundMark x1="84507" y1="71739" x2="81891" y2="87319"/>
+                        <a14:foregroundMark x1="5634" y1="11594" x2="7243" y2="16667"/>
+                        <a14:foregroundMark x1="36821" y1="25000" x2="43461" y2="31159"/>
+                        <a14:foregroundMark x1="60966" y1="23551" x2="54930" y2="38043"/>
+                        <a14:foregroundMark x1="31388" y1="18116" x2="43662" y2="17754"/>
+                        <a14:foregroundMark x1="47887" y1="25000" x2="43863" y2="17754"/>
+                        <a14:foregroundMark x1="51509" y1="25362" x2="55734" y2="17754"/>
+                        <a14:foregroundMark x1="55533" y1="18116" x2="68008" y2="18116"/>
+                        <a14:foregroundMark x1="68008" y1="18116" x2="72435" y2="24638"/>
+                        <a14:foregroundMark x1="26962" y1="25000" x2="31187" y2="17754"/>
+                        <a14:backgroundMark x1="26358" y1="72464" x2="26358" y2="72464"/>
+                        <a14:backgroundMark x1="5835" y1="53623" x2="32797" y2="85507"/>
+                        <a14:backgroundMark x1="23340" y1="9420" x2="25151" y2="40580"/>
+                        <a14:backgroundMark x1="91147" y1="3261" x2="88531" y2="12681"/>
+                        <a14:backgroundMark x1="91549" y1="70290" x2="95976" y2="89130"/>
+                        <a14:backgroundMark x1="73038" y1="33696" x2="74044" y2="53623"/>
+                        <a14:backgroundMark x1="55533" y1="97464" x2="70423" y2="97826"/>
+                        <a14:backgroundMark x1="70423" y1="73188" x2="70221" y2="83696"/>
+                      </a14:backgroundRemoval>
+                    </a14:imgEffect>
+                  </a14:imgLayer>
+                </a14:imgProps>
+              </a:ext>
+              <a:ext uri="{28A0092B-C50C-407E-A947-70E740481C1C}">
+                <a14:useLocalDpi xmlns:a14="http://schemas.microsoft.com/office/drawing/2010/main" val="0"/>
+              </a:ext>
+            </a:extLst>
+          </a:blip>
+          <a:srcRect/>
+          <a:stretch>
+            <a:fillRect/>
+          </a:stretch>
+        </p:blipFill>
+        <p:spPr bwMode="auto">
+          <a:xfrm>
+            <a:off x="7139704" y="1"/>
+            <a:ext cx="2012488" cy="1117599"/>
+          </a:xfrm>
+          <a:prstGeom prst="rect">
+            <a:avLst/>
+          </a:prstGeom>
+          <a:noFill/>
+          <a:ln>
+            <a:noFill/>
+          </a:ln>
+          <a:effectLst/>
+          <a:extLst>
+            <a:ext uri="{909E8E84-426E-40DD-AFC4-6F175D3DCCD1}">
+              <a14:hiddenFill xmlns:a14="http://schemas.microsoft.com/office/drawing/2010/main">
+                <a:solidFill>
+                  <a:schemeClr val="accent1"/>
+                </a:solidFill>
+              </a14:hiddenFill>
+            </a:ext>
+            <a:ext uri="{91240B29-F687-4F45-9708-019B960494DF}">
+              <a14:hiddenLine xmlns:a14="http://schemas.microsoft.com/office/drawing/2010/main" w="9525">
+                <a:solidFill>
+                  <a:schemeClr val="tx1"/>
+                </a:solidFill>
+                <a:miter lim="800000"/>
+                <a:headEnd/>
+                <a:tailEnd/>
+              </a14:hiddenLine>
+            </a:ext>
+            <a:ext uri="{AF507438-7753-43E0-B8FC-AC1667EBCBE1}">
+              <a14:hiddenEffects xmlns:a14="http://schemas.microsoft.com/office/drawing/2010/main">
+                <a:effectLst>
+                  <a:outerShdw dist="35921" dir="2700000" algn="ctr" rotWithShape="0">
+                    <a:schemeClr val="bg2"/>
+                  </a:outerShdw>
+                </a:effectLst>
+              </a14:hiddenEffects>
+            </a:ext>
+          </a:extLst>
         </p:spPr>
       </p:pic>
     </p:spTree>
@@ -2817,28 +3304,97 @@
       </p:sp>
       <p:pic>
         <p:nvPicPr>
-          <p:cNvPr id="13" name="Picture 12" descr="DRAFT.png"/>
+          <p:cNvPr id="10" name="Picture 6"/>
           <p:cNvPicPr>
-            <a:picLocks noChangeAspect="1"/>
+            <a:picLocks noChangeAspect="1" noChangeArrowheads="1"/>
           </p:cNvPicPr>
           <p:nvPr userDrawn="1"/>
         </p:nvPicPr>
         <p:blipFill>
           <a:blip r:embed="rId3" cstate="print">
-            <a:grayscl/>
+            <a:extLst>
+              <a:ext uri="{BEBA8EAE-BF5A-486C-A8C5-ECC9F3942E4B}">
+                <a14:imgProps xmlns:a14="http://schemas.microsoft.com/office/drawing/2010/main">
+                  <a14:imgLayer r:embed="rId4">
+                    <a14:imgEffect>
+                      <a14:backgroundRemoval t="0" b="100000" l="0" r="100000">
+                        <a14:foregroundMark x1="46278" y1="68478" x2="46278" y2="76812"/>
+                        <a14:foregroundMark x1="49497" y1="59783" x2="51107" y2="70652"/>
+                        <a14:foregroundMark x1="61569" y1="67391" x2="64185" y2="77174"/>
+                        <a14:foregroundMark x1="84507" y1="71739" x2="81891" y2="87319"/>
+                        <a14:foregroundMark x1="5634" y1="11594" x2="7243" y2="16667"/>
+                        <a14:foregroundMark x1="36821" y1="25000" x2="43461" y2="31159"/>
+                        <a14:foregroundMark x1="60966" y1="23551" x2="54930" y2="38043"/>
+                        <a14:foregroundMark x1="31388" y1="18116" x2="43662" y2="17754"/>
+                        <a14:foregroundMark x1="47887" y1="25000" x2="43863" y2="17754"/>
+                        <a14:foregroundMark x1="51509" y1="25362" x2="55734" y2="17754"/>
+                        <a14:foregroundMark x1="55533" y1="18116" x2="68008" y2="18116"/>
+                        <a14:foregroundMark x1="68008" y1="18116" x2="72435" y2="24638"/>
+                        <a14:foregroundMark x1="26962" y1="25000" x2="31187" y2="17754"/>
+                        <a14:backgroundMark x1="26358" y1="72464" x2="26358" y2="72464"/>
+                        <a14:backgroundMark x1="5835" y1="53623" x2="32797" y2="85507"/>
+                        <a14:backgroundMark x1="23340" y1="9420" x2="25151" y2="40580"/>
+                        <a14:backgroundMark x1="91147" y1="3261" x2="88531" y2="12681"/>
+                        <a14:backgroundMark x1="91549" y1="70290" x2="95976" y2="89130"/>
+                        <a14:backgroundMark x1="73038" y1="33696" x2="74044" y2="53623"/>
+                        <a14:backgroundMark x1="55533" y1="97464" x2="70423" y2="97826"/>
+                        <a14:backgroundMark x1="70423" y1="73188" x2="70221" y2="83696"/>
+                      </a14:backgroundRemoval>
+                    </a14:imgEffect>
+                  </a14:imgLayer>
+                </a14:imgProps>
+              </a:ext>
+              <a:ext uri="{28A0092B-C50C-407E-A947-70E740481C1C}">
+                <a14:useLocalDpi xmlns:a14="http://schemas.microsoft.com/office/drawing/2010/main" val="0"/>
+              </a:ext>
+            </a:extLst>
           </a:blip>
+          <a:srcRect/>
           <a:stretch>
             <a:fillRect/>
           </a:stretch>
         </p:blipFill>
-        <p:spPr>
-          <a:xfrm>
-            <a:off x="7136236" y="86550"/>
-            <a:ext cx="1899814" cy="430032"/>
+        <p:spPr bwMode="auto">
+          <a:xfrm>
+            <a:off x="7139704" y="1"/>
+            <a:ext cx="2012488" cy="1117599"/>
           </a:xfrm>
           <a:prstGeom prst="rect">
             <a:avLst/>
           </a:prstGeom>
+          <a:noFill/>
+          <a:ln>
+            <a:noFill/>
+          </a:ln>
+          <a:effectLst/>
+          <a:extLst>
+            <a:ext uri="{909E8E84-426E-40DD-AFC4-6F175D3DCCD1}">
+              <a14:hiddenFill xmlns:a14="http://schemas.microsoft.com/office/drawing/2010/main">
+                <a:solidFill>
+                  <a:schemeClr val="accent1"/>
+                </a:solidFill>
+              </a14:hiddenFill>
+            </a:ext>
+            <a:ext uri="{91240B29-F687-4F45-9708-019B960494DF}">
+              <a14:hiddenLine xmlns:a14="http://schemas.microsoft.com/office/drawing/2010/main" w="9525">
+                <a:solidFill>
+                  <a:schemeClr val="tx1"/>
+                </a:solidFill>
+                <a:miter lim="800000"/>
+                <a:headEnd/>
+                <a:tailEnd/>
+              </a14:hiddenLine>
+            </a:ext>
+            <a:ext uri="{AF507438-7753-43E0-B8FC-AC1667EBCBE1}">
+              <a14:hiddenEffects xmlns:a14="http://schemas.microsoft.com/office/drawing/2010/main">
+                <a:effectLst>
+                  <a:outerShdw dist="35921" dir="2700000" algn="ctr" rotWithShape="0">
+                    <a:schemeClr val="bg2"/>
+                  </a:outerShdw>
+                </a:effectLst>
+              </a14:hiddenEffects>
+            </a:ext>
+          </a:extLst>
         </p:spPr>
       </p:pic>
     </p:spTree>
@@ -3240,28 +3796,97 @@
       </p:sp>
       <p:pic>
         <p:nvPicPr>
-          <p:cNvPr id="13" name="Picture 12" descr="DRAFT.png"/>
+          <p:cNvPr id="14" name="Picture 6"/>
           <p:cNvPicPr>
-            <a:picLocks noChangeAspect="1"/>
+            <a:picLocks noChangeAspect="1" noChangeArrowheads="1"/>
           </p:cNvPicPr>
           <p:nvPr userDrawn="1"/>
         </p:nvPicPr>
         <p:blipFill>
           <a:blip r:embed="rId3" cstate="print">
-            <a:grayscl/>
+            <a:extLst>
+              <a:ext uri="{BEBA8EAE-BF5A-486C-A8C5-ECC9F3942E4B}">
+                <a14:imgProps xmlns:a14="http://schemas.microsoft.com/office/drawing/2010/main">
+                  <a14:imgLayer r:embed="rId4">
+                    <a14:imgEffect>
+                      <a14:backgroundRemoval t="0" b="100000" l="0" r="100000">
+                        <a14:foregroundMark x1="46278" y1="68478" x2="46278" y2="76812"/>
+                        <a14:foregroundMark x1="49497" y1="59783" x2="51107" y2="70652"/>
+                        <a14:foregroundMark x1="61569" y1="67391" x2="64185" y2="77174"/>
+                        <a14:foregroundMark x1="84507" y1="71739" x2="81891" y2="87319"/>
+                        <a14:foregroundMark x1="5634" y1="11594" x2="7243" y2="16667"/>
+                        <a14:foregroundMark x1="36821" y1="25000" x2="43461" y2="31159"/>
+                        <a14:foregroundMark x1="60966" y1="23551" x2="54930" y2="38043"/>
+                        <a14:foregroundMark x1="31388" y1="18116" x2="43662" y2="17754"/>
+                        <a14:foregroundMark x1="47887" y1="25000" x2="43863" y2="17754"/>
+                        <a14:foregroundMark x1="51509" y1="25362" x2="55734" y2="17754"/>
+                        <a14:foregroundMark x1="55533" y1="18116" x2="68008" y2="18116"/>
+                        <a14:foregroundMark x1="68008" y1="18116" x2="72435" y2="24638"/>
+                        <a14:foregroundMark x1="26962" y1="25000" x2="31187" y2="17754"/>
+                        <a14:backgroundMark x1="26358" y1="72464" x2="26358" y2="72464"/>
+                        <a14:backgroundMark x1="5835" y1="53623" x2="32797" y2="85507"/>
+                        <a14:backgroundMark x1="23340" y1="9420" x2="25151" y2="40580"/>
+                        <a14:backgroundMark x1="91147" y1="3261" x2="88531" y2="12681"/>
+                        <a14:backgroundMark x1="91549" y1="70290" x2="95976" y2="89130"/>
+                        <a14:backgroundMark x1="73038" y1="33696" x2="74044" y2="53623"/>
+                        <a14:backgroundMark x1="55533" y1="97464" x2="70423" y2="97826"/>
+                        <a14:backgroundMark x1="70423" y1="73188" x2="70221" y2="83696"/>
+                      </a14:backgroundRemoval>
+                    </a14:imgEffect>
+                  </a14:imgLayer>
+                </a14:imgProps>
+              </a:ext>
+              <a:ext uri="{28A0092B-C50C-407E-A947-70E740481C1C}">
+                <a14:useLocalDpi xmlns:a14="http://schemas.microsoft.com/office/drawing/2010/main" val="0"/>
+              </a:ext>
+            </a:extLst>
           </a:blip>
+          <a:srcRect/>
           <a:stretch>
             <a:fillRect/>
           </a:stretch>
         </p:blipFill>
-        <p:spPr>
-          <a:xfrm>
-            <a:off x="7136236" y="86550"/>
-            <a:ext cx="1899814" cy="430032"/>
+        <p:spPr bwMode="auto">
+          <a:xfrm>
+            <a:off x="7139704" y="1"/>
+            <a:ext cx="2012488" cy="1117599"/>
           </a:xfrm>
           <a:prstGeom prst="rect">
             <a:avLst/>
           </a:prstGeom>
+          <a:noFill/>
+          <a:ln>
+            <a:noFill/>
+          </a:ln>
+          <a:effectLst/>
+          <a:extLst>
+            <a:ext uri="{909E8E84-426E-40DD-AFC4-6F175D3DCCD1}">
+              <a14:hiddenFill xmlns:a14="http://schemas.microsoft.com/office/drawing/2010/main">
+                <a:solidFill>
+                  <a:schemeClr val="accent1"/>
+                </a:solidFill>
+              </a14:hiddenFill>
+            </a:ext>
+            <a:ext uri="{91240B29-F687-4F45-9708-019B960494DF}">
+              <a14:hiddenLine xmlns:a14="http://schemas.microsoft.com/office/drawing/2010/main" w="9525">
+                <a:solidFill>
+                  <a:schemeClr val="tx1"/>
+                </a:solidFill>
+                <a:miter lim="800000"/>
+                <a:headEnd/>
+                <a:tailEnd/>
+              </a14:hiddenLine>
+            </a:ext>
+            <a:ext uri="{AF507438-7753-43E0-B8FC-AC1667EBCBE1}">
+              <a14:hiddenEffects xmlns:a14="http://schemas.microsoft.com/office/drawing/2010/main">
+                <a:effectLst>
+                  <a:outerShdw dist="35921" dir="2700000" algn="ctr" rotWithShape="0">
+                    <a:schemeClr val="bg2"/>
+                  </a:outerShdw>
+                </a:effectLst>
+              </a14:hiddenEffects>
+            </a:ext>
+          </a:extLst>
         </p:spPr>
       </p:pic>
     </p:spTree>
@@ -3667,28 +4292,97 @@
       </p:sp>
       <p:pic>
         <p:nvPicPr>
-          <p:cNvPr id="11" name="Picture 10" descr="DRAFT.png"/>
+          <p:cNvPr id="15" name="Picture 6"/>
           <p:cNvPicPr>
-            <a:picLocks noChangeAspect="1"/>
+            <a:picLocks noChangeAspect="1" noChangeArrowheads="1"/>
           </p:cNvPicPr>
           <p:nvPr userDrawn="1"/>
         </p:nvPicPr>
         <p:blipFill>
           <a:blip r:embed="rId3" cstate="print">
-            <a:lum bright="70000" contrast="-70000"/>
+            <a:extLst>
+              <a:ext uri="{BEBA8EAE-BF5A-486C-A8C5-ECC9F3942E4B}">
+                <a14:imgProps xmlns:a14="http://schemas.microsoft.com/office/drawing/2010/main">
+                  <a14:imgLayer r:embed="rId4">
+                    <a14:imgEffect>
+                      <a14:backgroundRemoval t="0" b="100000" l="0" r="100000">
+                        <a14:foregroundMark x1="46278" y1="68478" x2="46278" y2="76812"/>
+                        <a14:foregroundMark x1="49497" y1="59783" x2="51107" y2="70652"/>
+                        <a14:foregroundMark x1="61569" y1="67391" x2="64185" y2="77174"/>
+                        <a14:foregroundMark x1="84507" y1="71739" x2="81891" y2="87319"/>
+                        <a14:foregroundMark x1="5634" y1="11594" x2="7243" y2="16667"/>
+                        <a14:foregroundMark x1="36821" y1="25000" x2="43461" y2="31159"/>
+                        <a14:foregroundMark x1="60966" y1="23551" x2="54930" y2="38043"/>
+                        <a14:foregroundMark x1="31388" y1="18116" x2="43662" y2="17754"/>
+                        <a14:foregroundMark x1="47887" y1="25000" x2="43863" y2="17754"/>
+                        <a14:foregroundMark x1="51509" y1="25362" x2="55734" y2="17754"/>
+                        <a14:foregroundMark x1="55533" y1="18116" x2="68008" y2="18116"/>
+                        <a14:foregroundMark x1="68008" y1="18116" x2="72435" y2="24638"/>
+                        <a14:foregroundMark x1="26962" y1="25000" x2="31187" y2="17754"/>
+                        <a14:backgroundMark x1="26358" y1="72464" x2="26358" y2="72464"/>
+                        <a14:backgroundMark x1="5835" y1="53623" x2="32797" y2="85507"/>
+                        <a14:backgroundMark x1="23340" y1="9420" x2="25151" y2="40580"/>
+                        <a14:backgroundMark x1="91147" y1="3261" x2="88531" y2="12681"/>
+                        <a14:backgroundMark x1="91549" y1="70290" x2="95976" y2="89130"/>
+                        <a14:backgroundMark x1="73038" y1="33696" x2="74044" y2="53623"/>
+                        <a14:backgroundMark x1="55533" y1="97464" x2="70423" y2="97826"/>
+                        <a14:backgroundMark x1="70423" y1="73188" x2="70221" y2="83696"/>
+                      </a14:backgroundRemoval>
+                    </a14:imgEffect>
+                  </a14:imgLayer>
+                </a14:imgProps>
+              </a:ext>
+              <a:ext uri="{28A0092B-C50C-407E-A947-70E740481C1C}">
+                <a14:useLocalDpi xmlns:a14="http://schemas.microsoft.com/office/drawing/2010/main" val="0"/>
+              </a:ext>
+            </a:extLst>
           </a:blip>
+          <a:srcRect/>
           <a:stretch>
             <a:fillRect/>
           </a:stretch>
         </p:blipFill>
-        <p:spPr>
-          <a:xfrm>
-            <a:off x="7136236" y="86550"/>
-            <a:ext cx="1899814" cy="430032"/>
+        <p:spPr bwMode="auto">
+          <a:xfrm>
+            <a:off x="7139704" y="1"/>
+            <a:ext cx="2012488" cy="1117599"/>
           </a:xfrm>
           <a:prstGeom prst="rect">
             <a:avLst/>
           </a:prstGeom>
+          <a:noFill/>
+          <a:ln>
+            <a:noFill/>
+          </a:ln>
+          <a:effectLst/>
+          <a:extLst>
+            <a:ext uri="{909E8E84-426E-40DD-AFC4-6F175D3DCCD1}">
+              <a14:hiddenFill xmlns:a14="http://schemas.microsoft.com/office/drawing/2010/main">
+                <a:solidFill>
+                  <a:schemeClr val="accent1"/>
+                </a:solidFill>
+              </a14:hiddenFill>
+            </a:ext>
+            <a:ext uri="{91240B29-F687-4F45-9708-019B960494DF}">
+              <a14:hiddenLine xmlns:a14="http://schemas.microsoft.com/office/drawing/2010/main" w="9525">
+                <a:solidFill>
+                  <a:schemeClr val="tx1"/>
+                </a:solidFill>
+                <a:miter lim="800000"/>
+                <a:headEnd/>
+                <a:tailEnd/>
+              </a14:hiddenLine>
+            </a:ext>
+            <a:ext uri="{AF507438-7753-43E0-B8FC-AC1667EBCBE1}">
+              <a14:hiddenEffects xmlns:a14="http://schemas.microsoft.com/office/drawing/2010/main">
+                <a:effectLst>
+                  <a:outerShdw dist="35921" dir="2700000" algn="ctr" rotWithShape="0">
+                    <a:schemeClr val="bg2"/>
+                  </a:outerShdw>
+                </a:effectLst>
+              </a14:hiddenEffects>
+            </a:ext>
+          </a:extLst>
         </p:spPr>
       </p:pic>
     </p:spTree>
@@ -4244,28 +4938,97 @@
       </p:sp>
       <p:pic>
         <p:nvPicPr>
-          <p:cNvPr id="17" name="Picture 16" descr="DRAFT.png"/>
+          <p:cNvPr id="15" name="Picture 6"/>
           <p:cNvPicPr>
-            <a:picLocks noChangeAspect="1"/>
+            <a:picLocks noChangeAspect="1" noChangeArrowheads="1"/>
           </p:cNvPicPr>
           <p:nvPr userDrawn="1"/>
         </p:nvPicPr>
         <p:blipFill>
           <a:blip r:embed="rId3" cstate="print">
-            <a:grayscl/>
+            <a:extLst>
+              <a:ext uri="{BEBA8EAE-BF5A-486C-A8C5-ECC9F3942E4B}">
+                <a14:imgProps xmlns:a14="http://schemas.microsoft.com/office/drawing/2010/main">
+                  <a14:imgLayer r:embed="rId4">
+                    <a14:imgEffect>
+                      <a14:backgroundRemoval t="0" b="100000" l="0" r="100000">
+                        <a14:foregroundMark x1="46278" y1="68478" x2="46278" y2="76812"/>
+                        <a14:foregroundMark x1="49497" y1="59783" x2="51107" y2="70652"/>
+                        <a14:foregroundMark x1="61569" y1="67391" x2="64185" y2="77174"/>
+                        <a14:foregroundMark x1="84507" y1="71739" x2="81891" y2="87319"/>
+                        <a14:foregroundMark x1="5634" y1="11594" x2="7243" y2="16667"/>
+                        <a14:foregroundMark x1="36821" y1="25000" x2="43461" y2="31159"/>
+                        <a14:foregroundMark x1="60966" y1="23551" x2="54930" y2="38043"/>
+                        <a14:foregroundMark x1="31388" y1="18116" x2="43662" y2="17754"/>
+                        <a14:foregroundMark x1="47887" y1="25000" x2="43863" y2="17754"/>
+                        <a14:foregroundMark x1="51509" y1="25362" x2="55734" y2="17754"/>
+                        <a14:foregroundMark x1="55533" y1="18116" x2="68008" y2="18116"/>
+                        <a14:foregroundMark x1="68008" y1="18116" x2="72435" y2="24638"/>
+                        <a14:foregroundMark x1="26962" y1="25000" x2="31187" y2="17754"/>
+                        <a14:backgroundMark x1="26358" y1="72464" x2="26358" y2="72464"/>
+                        <a14:backgroundMark x1="5835" y1="53623" x2="32797" y2="85507"/>
+                        <a14:backgroundMark x1="23340" y1="9420" x2="25151" y2="40580"/>
+                        <a14:backgroundMark x1="91147" y1="3261" x2="88531" y2="12681"/>
+                        <a14:backgroundMark x1="91549" y1="70290" x2="95976" y2="89130"/>
+                        <a14:backgroundMark x1="73038" y1="33696" x2="74044" y2="53623"/>
+                        <a14:backgroundMark x1="55533" y1="97464" x2="70423" y2="97826"/>
+                        <a14:backgroundMark x1="70423" y1="73188" x2="70221" y2="83696"/>
+                      </a14:backgroundRemoval>
+                    </a14:imgEffect>
+                  </a14:imgLayer>
+                </a14:imgProps>
+              </a:ext>
+              <a:ext uri="{28A0092B-C50C-407E-A947-70E740481C1C}">
+                <a14:useLocalDpi xmlns:a14="http://schemas.microsoft.com/office/drawing/2010/main" val="0"/>
+              </a:ext>
+            </a:extLst>
           </a:blip>
+          <a:srcRect/>
           <a:stretch>
             <a:fillRect/>
           </a:stretch>
         </p:blipFill>
-        <p:spPr>
-          <a:xfrm>
-            <a:off x="7136236" y="86550"/>
-            <a:ext cx="1899814" cy="430032"/>
+        <p:spPr bwMode="auto">
+          <a:xfrm>
+            <a:off x="7139704" y="1"/>
+            <a:ext cx="2012488" cy="1117599"/>
           </a:xfrm>
           <a:prstGeom prst="rect">
             <a:avLst/>
           </a:prstGeom>
+          <a:noFill/>
+          <a:ln>
+            <a:noFill/>
+          </a:ln>
+          <a:effectLst/>
+          <a:extLst>
+            <a:ext uri="{909E8E84-426E-40DD-AFC4-6F175D3DCCD1}">
+              <a14:hiddenFill xmlns:a14="http://schemas.microsoft.com/office/drawing/2010/main">
+                <a:solidFill>
+                  <a:schemeClr val="accent1"/>
+                </a:solidFill>
+              </a14:hiddenFill>
+            </a:ext>
+            <a:ext uri="{91240B29-F687-4F45-9708-019B960494DF}">
+              <a14:hiddenLine xmlns:a14="http://schemas.microsoft.com/office/drawing/2010/main" w="9525">
+                <a:solidFill>
+                  <a:schemeClr val="tx1"/>
+                </a:solidFill>
+                <a:miter lim="800000"/>
+                <a:headEnd/>
+                <a:tailEnd/>
+              </a14:hiddenLine>
+            </a:ext>
+            <a:ext uri="{AF507438-7753-43E0-B8FC-AC1667EBCBE1}">
+              <a14:hiddenEffects xmlns:a14="http://schemas.microsoft.com/office/drawing/2010/main">
+                <a:effectLst>
+                  <a:outerShdw dist="35921" dir="2700000" algn="ctr" rotWithShape="0">
+                    <a:schemeClr val="bg2"/>
+                  </a:outerShdw>
+                </a:effectLst>
+              </a14:hiddenEffects>
+            </a:ext>
+          </a:extLst>
         </p:spPr>
       </p:pic>
     </p:spTree>
@@ -4825,28 +5588,97 @@
       </p:sp>
       <p:pic>
         <p:nvPicPr>
-          <p:cNvPr id="16" name="Picture 15" descr="DRAFT.png"/>
+          <p:cNvPr id="18" name="Picture 6"/>
           <p:cNvPicPr>
-            <a:picLocks noChangeAspect="1"/>
+            <a:picLocks noChangeAspect="1" noChangeArrowheads="1"/>
           </p:cNvPicPr>
           <p:nvPr userDrawn="1"/>
         </p:nvPicPr>
         <p:blipFill>
           <a:blip r:embed="rId3" cstate="print">
-            <a:lum bright="70000" contrast="-70000"/>
+            <a:extLst>
+              <a:ext uri="{BEBA8EAE-BF5A-486C-A8C5-ECC9F3942E4B}">
+                <a14:imgProps xmlns:a14="http://schemas.microsoft.com/office/drawing/2010/main">
+                  <a14:imgLayer r:embed="rId4">
+                    <a14:imgEffect>
+                      <a14:backgroundRemoval t="0" b="100000" l="0" r="100000">
+                        <a14:foregroundMark x1="46278" y1="68478" x2="46278" y2="76812"/>
+                        <a14:foregroundMark x1="49497" y1="59783" x2="51107" y2="70652"/>
+                        <a14:foregroundMark x1="61569" y1="67391" x2="64185" y2="77174"/>
+                        <a14:foregroundMark x1="84507" y1="71739" x2="81891" y2="87319"/>
+                        <a14:foregroundMark x1="5634" y1="11594" x2="7243" y2="16667"/>
+                        <a14:foregroundMark x1="36821" y1="25000" x2="43461" y2="31159"/>
+                        <a14:foregroundMark x1="60966" y1="23551" x2="54930" y2="38043"/>
+                        <a14:foregroundMark x1="31388" y1="18116" x2="43662" y2="17754"/>
+                        <a14:foregroundMark x1="47887" y1="25000" x2="43863" y2="17754"/>
+                        <a14:foregroundMark x1="51509" y1="25362" x2="55734" y2="17754"/>
+                        <a14:foregroundMark x1="55533" y1="18116" x2="68008" y2="18116"/>
+                        <a14:foregroundMark x1="68008" y1="18116" x2="72435" y2="24638"/>
+                        <a14:foregroundMark x1="26962" y1="25000" x2="31187" y2="17754"/>
+                        <a14:backgroundMark x1="26358" y1="72464" x2="26358" y2="72464"/>
+                        <a14:backgroundMark x1="5835" y1="53623" x2="32797" y2="85507"/>
+                        <a14:backgroundMark x1="23340" y1="9420" x2="25151" y2="40580"/>
+                        <a14:backgroundMark x1="91147" y1="3261" x2="88531" y2="12681"/>
+                        <a14:backgroundMark x1="91549" y1="70290" x2="95976" y2="89130"/>
+                        <a14:backgroundMark x1="73038" y1="33696" x2="74044" y2="53623"/>
+                        <a14:backgroundMark x1="55533" y1="97464" x2="70423" y2="97826"/>
+                        <a14:backgroundMark x1="70423" y1="73188" x2="70221" y2="83696"/>
+                      </a14:backgroundRemoval>
+                    </a14:imgEffect>
+                  </a14:imgLayer>
+                </a14:imgProps>
+              </a:ext>
+              <a:ext uri="{28A0092B-C50C-407E-A947-70E740481C1C}">
+                <a14:useLocalDpi xmlns:a14="http://schemas.microsoft.com/office/drawing/2010/main" val="0"/>
+              </a:ext>
+            </a:extLst>
           </a:blip>
+          <a:srcRect/>
           <a:stretch>
             <a:fillRect/>
           </a:stretch>
         </p:blipFill>
-        <p:spPr>
-          <a:xfrm>
-            <a:off x="7136236" y="86550"/>
-            <a:ext cx="1899814" cy="430032"/>
+        <p:spPr bwMode="auto">
+          <a:xfrm>
+            <a:off x="7139704" y="1"/>
+            <a:ext cx="2012488" cy="1117599"/>
           </a:xfrm>
           <a:prstGeom prst="rect">
             <a:avLst/>
           </a:prstGeom>
+          <a:noFill/>
+          <a:ln>
+            <a:noFill/>
+          </a:ln>
+          <a:effectLst/>
+          <a:extLst>
+            <a:ext uri="{909E8E84-426E-40DD-AFC4-6F175D3DCCD1}">
+              <a14:hiddenFill xmlns:a14="http://schemas.microsoft.com/office/drawing/2010/main">
+                <a:solidFill>
+                  <a:schemeClr val="accent1"/>
+                </a:solidFill>
+              </a14:hiddenFill>
+            </a:ext>
+            <a:ext uri="{91240B29-F687-4F45-9708-019B960494DF}">
+              <a14:hiddenLine xmlns:a14="http://schemas.microsoft.com/office/drawing/2010/main" w="9525">
+                <a:solidFill>
+                  <a:schemeClr val="tx1"/>
+                </a:solidFill>
+                <a:miter lim="800000"/>
+                <a:headEnd/>
+                <a:tailEnd/>
+              </a14:hiddenLine>
+            </a:ext>
+            <a:ext uri="{AF507438-7753-43E0-B8FC-AC1667EBCBE1}">
+              <a14:hiddenEffects xmlns:a14="http://schemas.microsoft.com/office/drawing/2010/main">
+                <a:effectLst>
+                  <a:outerShdw dist="35921" dir="2700000" algn="ctr" rotWithShape="0">
+                    <a:schemeClr val="bg2"/>
+                  </a:outerShdw>
+                </a:effectLst>
+              </a14:hiddenEffects>
+            </a:ext>
+          </a:extLst>
         </p:spPr>
       </p:pic>
     </p:spTree>
@@ -5408,10 +6240,10 @@
           <a:lstStyle/>
           <a:p>
             <a:r>
-              <a:rPr lang="en-US" noProof="0" smtClean="0"/>
+              <a:rPr lang="en-US" noProof="0" dirty="0" smtClean="0"/>
               <a:t>TV-Tram</a:t>
             </a:r>
-            <a:endParaRPr lang="en-US" noProof="0"/>
+            <a:endParaRPr lang="en-US" noProof="0" dirty="0"/>
           </a:p>
         </p:txBody>
       </p:sp>
@@ -5431,16 +6263,16 @@
           <a:lstStyle/>
           <a:p>
             <a:r>
-              <a:rPr lang="en-US" noProof="0" smtClean="0"/>
+              <a:rPr lang="en-US" noProof="0" dirty="0" smtClean="0"/>
               <a:t>Team Tempo</a:t>
             </a:r>
           </a:p>
           <a:p>
             <a:r>
-              <a:rPr lang="en-US" sz="1400" noProof="0" smtClean="0"/>
+              <a:rPr lang="en-US" sz="1400" noProof="0" dirty="0" smtClean="0"/>
               <a:t>Stefan Chrobot, Roberto Liffredo, Tomasz Olszewski , Jan Vogelgesang</a:t>
             </a:r>
-            <a:endParaRPr lang="en-US" sz="1400" noProof="0"/>
+            <a:endParaRPr lang="en-US" sz="1400" noProof="0" dirty="0"/>
           </a:p>
         </p:txBody>
       </p:sp>
@@ -5470,12 +6302,12 @@
       </p:sp>
       <p:sp>
         <p:nvSpPr>
-          <p:cNvPr id="7" name="Footer Placeholder 6"/>
-          <p:cNvSpPr>
-            <a:spLocks noGrp="1"/>
-          </p:cNvSpPr>
-          <p:nvPr>
-            <p:ph type="ftr" sz="quarter" idx="11"/>
+          <p:cNvPr id="8" name="Date Placeholder 7"/>
+          <p:cNvSpPr>
+            <a:spLocks noGrp="1"/>
+          </p:cNvSpPr>
+          <p:nvPr>
+            <p:ph type="dt" sz="half" idx="10"/>
           </p:nvPr>
         </p:nvSpPr>
         <p:spPr/>
@@ -5485,99 +6317,12 @@
           <a:p>
             <a:r>
               <a:rPr lang="en-US" dirty="0" smtClean="0"/>
-              <a:t>confidential</a:t>
+              <a:t>technology</a:t>
             </a:r>
             <a:endParaRPr lang="en-US" dirty="0"/>
           </a:p>
         </p:txBody>
       </p:sp>
-      <p:sp>
-        <p:nvSpPr>
-          <p:cNvPr id="8" name="Date Placeholder 7"/>
-          <p:cNvSpPr>
-            <a:spLocks noGrp="1"/>
-          </p:cNvSpPr>
-          <p:nvPr>
-            <p:ph type="dt" sz="half" idx="10"/>
-          </p:nvPr>
-        </p:nvSpPr>
-        <p:spPr/>
-        <p:txBody>
-          <a:bodyPr/>
-          <a:lstStyle/>
-          <a:p>
-            <a:r>
-              <a:rPr lang="en-US" dirty="0" smtClean="0"/>
-              <a:t>technology</a:t>
-            </a:r>
-            <a:endParaRPr lang="en-US" dirty="0"/>
-          </a:p>
-        </p:txBody>
-      </p:sp>
-      <p:pic>
-        <p:nvPicPr>
-          <p:cNvPr id="1026" name="Picture 2"/>
-          <p:cNvPicPr>
-            <a:picLocks noChangeAspect="1" noChangeArrowheads="1"/>
-          </p:cNvPicPr>
-          <p:nvPr/>
-        </p:nvPicPr>
-        <p:blipFill>
-          <a:blip r:embed="rId2">
-            <a:extLst>
-              <a:ext uri="{28A0092B-C50C-407E-A947-70E740481C1C}">
-                <a14:useLocalDpi xmlns:a14="http://schemas.microsoft.com/office/drawing/2010/main" val="0"/>
-              </a:ext>
-            </a:extLst>
-          </a:blip>
-          <a:srcRect/>
-          <a:stretch>
-            <a:fillRect/>
-          </a:stretch>
-        </p:blipFill>
-        <p:spPr bwMode="auto">
-          <a:xfrm>
-            <a:off x="2633663" y="1142999"/>
-            <a:ext cx="4130855" cy="2257425"/>
-          </a:xfrm>
-          <a:prstGeom prst="rect">
-            <a:avLst/>
-          </a:prstGeom>
-          <a:noFill/>
-          <a:ln>
-            <a:noFill/>
-          </a:ln>
-          <a:effectLst/>
-          <a:extLst>
-            <a:ext uri="{909E8E84-426E-40DD-AFC4-6F175D3DCCD1}">
-              <a14:hiddenFill xmlns:a14="http://schemas.microsoft.com/office/drawing/2010/main">
-                <a:solidFill>
-                  <a:schemeClr val="accent1"/>
-                </a:solidFill>
-              </a14:hiddenFill>
-            </a:ext>
-            <a:ext uri="{91240B29-F687-4F45-9708-019B960494DF}">
-              <a14:hiddenLine xmlns:a14="http://schemas.microsoft.com/office/drawing/2010/main" w="9525">
-                <a:solidFill>
-                  <a:schemeClr val="tx1"/>
-                </a:solidFill>
-                <a:miter lim="800000"/>
-                <a:headEnd/>
-                <a:tailEnd/>
-              </a14:hiddenLine>
-            </a:ext>
-            <a:ext uri="{AF507438-7753-43E0-B8FC-AC1667EBCBE1}">
-              <a14:hiddenEffects xmlns:a14="http://schemas.microsoft.com/office/drawing/2010/main">
-                <a:effectLst>
-                  <a:outerShdw dist="35921" dir="2700000" algn="ctr" rotWithShape="0">
-                    <a:schemeClr val="bg2"/>
-                  </a:outerShdw>
-                </a:effectLst>
-              </a14:hiddenEffects>
-            </a:ext>
-          </a:extLst>
-        </p:spPr>
-      </p:pic>
     </p:spTree>
   </p:cSld>
   <p:clrMapOvr>
@@ -5664,20 +6409,33 @@
             </a:r>
             <a:r>
               <a:rPr lang="en-US" noProof="0" dirty="0" smtClean="0"/>
-              <a:t>: Use a television to display public transportation timetable for </a:t>
-            </a:r>
-            <a:r>
-              <a:rPr lang="pl-PL" noProof="0" smtClean="0"/>
+              <a:t>: Use </a:t>
+            </a:r>
+            <a:r>
+              <a:rPr lang="en-US" noProof="0" dirty="0" smtClean="0"/>
+              <a:t>TV </a:t>
+            </a:r>
+            <a:r>
+              <a:rPr lang="en-US" noProof="0" dirty="0" smtClean="0"/>
+              <a:t>to display public transportation timetable for </a:t>
+            </a:r>
+            <a:r>
+              <a:rPr lang="pl-PL" noProof="0" dirty="0" smtClean="0"/>
               <a:t>tram and </a:t>
             </a:r>
             <a:r>
-              <a:rPr lang="en-US" noProof="0" smtClean="0"/>
-              <a:t>bus </a:t>
-            </a:r>
-            <a:r>
               <a:rPr lang="en-US" noProof="0" dirty="0" smtClean="0"/>
-              <a:t>stops near the facility </a:t>
-            </a:r>
+              <a:t>bus stops near </a:t>
+            </a:r>
+            <a:r>
+              <a:rPr lang="en-US" noProof="0" dirty="0" err="1" smtClean="0"/>
+              <a:t>Buma</a:t>
+            </a:r>
+            <a:r>
+              <a:rPr lang="en-US" noProof="0" dirty="0" smtClean="0"/>
+              <a:t> Square</a:t>
+            </a:r>
+            <a:endParaRPr lang="en-US" noProof="0" dirty="0" smtClean="0"/>
           </a:p>
           <a:p>
             <a:r>
@@ -5686,8 +6444,13 @@
             </a:r>
             <a:r>
               <a:rPr lang="en-US" noProof="0" dirty="0" smtClean="0"/>
-              <a:t>: Show how inexpensive hardware can be used to create data visualization; </a:t>
-            </a:r>
+              <a:t>: Show how inexpensive hardware can be used to create data </a:t>
+            </a:r>
+            <a:r>
+              <a:rPr lang="en-US" noProof="0" dirty="0" smtClean="0"/>
+              <a:t>visualization</a:t>
+            </a:r>
+            <a:endParaRPr lang="en-US" noProof="0" dirty="0" smtClean="0"/>
           </a:p>
           <a:p>
             <a:r>
@@ -5696,11 +6459,35 @@
             </a:r>
             <a:r>
               <a:rPr lang="en-US" noProof="0" dirty="0" smtClean="0"/>
-              <a:t>: TODO: copy &amp; paste from </a:t>
-            </a:r>
-            <a:r>
-              <a:rPr lang="en-US" noProof="0" dirty="0" err="1" smtClean="0"/>
-              <a:t>sharepoint</a:t>
+              <a:t>: </a:t>
+            </a:r>
+            <a:r>
+              <a:rPr lang="en-US" dirty="0"/>
+              <a:t>TV-Tram </a:t>
+            </a:r>
+            <a:r>
+              <a:rPr lang="en-US" dirty="0" smtClean="0"/>
+              <a:t>– a </a:t>
+            </a:r>
+            <a:r>
+              <a:rPr lang="en-US" dirty="0"/>
+              <a:t>project for </a:t>
+            </a:r>
+            <a:r>
+              <a:rPr lang="en-US" dirty="0" smtClean="0"/>
+              <a:t>improving </a:t>
+            </a:r>
+            <a:r>
+              <a:rPr lang="en-US" dirty="0"/>
+              <a:t>quality of life by showing the public transport timetable for stops near </a:t>
+            </a:r>
+            <a:r>
+              <a:rPr lang="en-US" dirty="0" err="1"/>
+              <a:t>Buma</a:t>
+            </a:r>
+            <a:r>
+              <a:rPr lang="en-US" dirty="0"/>
+              <a:t> Square.</a:t>
             </a:r>
             <a:endParaRPr lang="en-US" noProof="0" dirty="0" smtClean="0"/>
           </a:p>
@@ -5727,29 +6514,6 @@
             <a:r>
               <a:rPr lang="en-US" dirty="0" smtClean="0"/>
               <a:t>technology</a:t>
-            </a:r>
-            <a:endParaRPr lang="en-US" dirty="0"/>
-          </a:p>
-        </p:txBody>
-      </p:sp>
-      <p:sp>
-        <p:nvSpPr>
-          <p:cNvPr id="5" name="Footer Placeholder 4"/>
-          <p:cNvSpPr>
-            <a:spLocks noGrp="1"/>
-          </p:cNvSpPr>
-          <p:nvPr>
-            <p:ph type="ftr" sz="quarter" idx="11"/>
-          </p:nvPr>
-        </p:nvSpPr>
-        <p:spPr/>
-        <p:txBody>
-          <a:bodyPr/>
-          <a:lstStyle/>
-          <a:p>
-            <a:r>
-              <a:rPr lang="en-US" smtClean="0"/>
-              <a:t>confidential</a:t>
             </a:r>
             <a:endParaRPr lang="en-US" dirty="0"/>
           </a:p>
@@ -5836,12 +6600,12 @@
       </p:sp>
       <p:sp>
         <p:nvSpPr>
-          <p:cNvPr id="3" name="Content Placeholder 2"/>
-          <p:cNvSpPr>
-            <a:spLocks noGrp="1"/>
-          </p:cNvSpPr>
-          <p:nvPr>
-            <p:ph idx="1"/>
+          <p:cNvPr id="4" name="Date Placeholder 3"/>
+          <p:cNvSpPr>
+            <a:spLocks noGrp="1"/>
+          </p:cNvSpPr>
+          <p:nvPr>
+            <p:ph type="dt" sz="half" idx="10"/>
           </p:nvPr>
         </p:nvSpPr>
         <p:spPr/>
@@ -5850,59 +6614,8 @@
           <a:lstStyle/>
           <a:p>
             <a:r>
-              <a:rPr lang="en-US" noProof="0" dirty="0" smtClean="0"/>
-              <a:t>Your presentation should have at least one screenshots showing real operations</a:t>
-            </a:r>
-          </a:p>
-          <a:p>
-            <a:r>
-              <a:rPr lang="en-US" noProof="0" dirty="0" smtClean="0"/>
-              <a:t>Delete this box and insert screenshot #1 here</a:t>
-            </a:r>
-          </a:p>
-        </p:txBody>
-      </p:sp>
-      <p:sp>
-        <p:nvSpPr>
-          <p:cNvPr id="4" name="Date Placeholder 3"/>
-          <p:cNvSpPr>
-            <a:spLocks noGrp="1"/>
-          </p:cNvSpPr>
-          <p:nvPr>
-            <p:ph type="dt" sz="half" idx="10"/>
-          </p:nvPr>
-        </p:nvSpPr>
-        <p:spPr/>
-        <p:txBody>
-          <a:bodyPr/>
-          <a:lstStyle/>
-          <a:p>
-            <a:r>
               <a:rPr lang="en-US" smtClean="0"/>
               <a:t>technology</a:t>
-            </a:r>
-            <a:endParaRPr lang="en-US" dirty="0"/>
-          </a:p>
-        </p:txBody>
-      </p:sp>
-      <p:sp>
-        <p:nvSpPr>
-          <p:cNvPr id="5" name="Footer Placeholder 4"/>
-          <p:cNvSpPr>
-            <a:spLocks noGrp="1"/>
-          </p:cNvSpPr>
-          <p:nvPr>
-            <p:ph type="ftr" sz="quarter" idx="11"/>
-          </p:nvPr>
-        </p:nvSpPr>
-        <p:spPr/>
-        <p:txBody>
-          <a:bodyPr/>
-          <a:lstStyle/>
-          <a:p>
-            <a:r>
-              <a:rPr lang="en-US" smtClean="0"/>
-              <a:t>confidential</a:t>
             </a:r>
             <a:endParaRPr lang="en-US" dirty="0"/>
           </a:p>
@@ -5955,7 +6668,7 @@
         </p:blipFill>
         <p:spPr bwMode="auto">
           <a:xfrm>
-            <a:off x="476250" y="1184503"/>
+            <a:off x="585105" y="1206274"/>
             <a:ext cx="7971063" cy="4816588"/>
           </a:xfrm>
           <a:prstGeom prst="rect">
@@ -6006,11 +6719,18 @@
   <p:clrMapOvr>
     <a:masterClrMapping/>
   </p:clrMapOvr>
+  <p:timing>
+    <p:tnLst>
+      <p:par>
+        <p:cTn id="1" dur="indefinite" restart="never" nodeType="tmRoot"/>
+      </p:par>
+    </p:tnLst>
+  </p:timing>
 </p:sld>
 </file>
 
 <file path=ppt/slides/slide4.xml><?xml version="1.0" encoding="utf-8"?>
-<p:sld xmlns:a="http://schemas.openxmlformats.org/drawingml/2006/main" xmlns:r="http://schemas.openxmlformats.org/officeDocument/2006/relationships" xmlns:p="http://schemas.openxmlformats.org/presentationml/2006/main">
+<p:sld xmlns:a="http://schemas.openxmlformats.org/drawingml/2006/main" xmlns:r="http://schemas.openxmlformats.org/officeDocument/2006/relationships" xmlns:p="http://schemas.openxmlformats.org/presentationml/2006/main" show="0">
   <p:cSld>
     <p:spTree>
       <p:nvGrpSpPr>
@@ -6042,37 +6762,10 @@
           <a:lstStyle/>
           <a:p>
             <a:r>
-              <a:rPr lang="en-US" noProof="0" smtClean="0"/>
-              <a:t>Feel free to add something here</a:t>
-            </a:r>
-            <a:endParaRPr lang="en-US" noProof="0"/>
-          </a:p>
-        </p:txBody>
-      </p:sp>
-      <p:sp>
-        <p:nvSpPr>
-          <p:cNvPr id="3" name="Content Placeholder 2"/>
-          <p:cNvSpPr>
-            <a:spLocks noGrp="1"/>
-          </p:cNvSpPr>
-          <p:nvPr>
-            <p:ph idx="1"/>
-          </p:nvPr>
-        </p:nvSpPr>
-        <p:spPr/>
-        <p:txBody>
-          <a:bodyPr/>
-          <a:lstStyle/>
-          <a:p>
-            <a:r>
-              <a:rPr lang="en-US" noProof="0" smtClean="0"/>
-              <a:t>But remember that you have </a:t>
-            </a:r>
-            <a:r>
-              <a:rPr lang="en-US" b="1" noProof="0" smtClean="0"/>
-              <a:t>5 minutes!</a:t>
-            </a:r>
-            <a:endParaRPr lang="en-US" b="1" noProof="0"/>
+              <a:rPr lang="en-US" dirty="0" smtClean="0"/>
+              <a:t>Final version!</a:t>
+            </a:r>
+            <a:endParaRPr lang="en-US" dirty="0"/>
           </a:p>
         </p:txBody>
       </p:sp>
@@ -6146,16 +6839,95 @@
           </a:p>
         </p:txBody>
       </p:sp>
+      <p:pic>
+        <p:nvPicPr>
+          <p:cNvPr id="2050" name="Picture 2"/>
+          <p:cNvPicPr>
+            <a:picLocks noChangeAspect="1" noChangeArrowheads="1"/>
+          </p:cNvPicPr>
+          <p:nvPr/>
+        </p:nvPicPr>
+        <p:blipFill>
+          <a:blip r:embed="rId2">
+            <a:extLst>
+              <a:ext uri="{28A0092B-C50C-407E-A947-70E740481C1C}">
+                <a14:useLocalDpi xmlns:a14="http://schemas.microsoft.com/office/drawing/2010/main" val="0"/>
+              </a:ext>
+            </a:extLst>
+          </a:blip>
+          <a:srcRect/>
+          <a:stretch>
+            <a:fillRect/>
+          </a:stretch>
+        </p:blipFill>
+        <p:spPr bwMode="auto">
+          <a:xfrm>
+            <a:off x="464458" y="1221190"/>
+            <a:ext cx="8331200" cy="4722711"/>
+          </a:xfrm>
+          <a:prstGeom prst="rect">
+            <a:avLst/>
+          </a:prstGeom>
+          <a:noFill/>
+          <a:ln>
+            <a:noFill/>
+          </a:ln>
+          <a:effectLst/>
+          <a:extLst>
+            <a:ext uri="{909E8E84-426E-40DD-AFC4-6F175D3DCCD1}">
+              <a14:hiddenFill xmlns:a14="http://schemas.microsoft.com/office/drawing/2010/main">
+                <a:solidFill>
+                  <a:schemeClr val="accent1"/>
+                </a:solidFill>
+              </a14:hiddenFill>
+            </a:ext>
+            <a:ext uri="{91240B29-F687-4F45-9708-019B960494DF}">
+              <a14:hiddenLine xmlns:a14="http://schemas.microsoft.com/office/drawing/2010/main" w="9525">
+                <a:solidFill>
+                  <a:schemeClr val="tx1"/>
+                </a:solidFill>
+                <a:miter lim="800000"/>
+                <a:headEnd/>
+                <a:tailEnd/>
+              </a14:hiddenLine>
+            </a:ext>
+            <a:ext uri="{AF507438-7753-43E0-B8FC-AC1667EBCBE1}">
+              <a14:hiddenEffects xmlns:a14="http://schemas.microsoft.com/office/drawing/2010/main">
+                <a:effectLst>
+                  <a:outerShdw dist="35921" dir="2700000" algn="ctr" rotWithShape="0">
+                    <a:schemeClr val="bg2"/>
+                  </a:outerShdw>
+                </a:effectLst>
+              </a14:hiddenEffects>
+            </a:ext>
+          </a:extLst>
+        </p:spPr>
+      </p:pic>
     </p:spTree>
     <p:extLst>
       <p:ext uri="{BB962C8B-B14F-4D97-AF65-F5344CB8AC3E}">
-        <p14:creationId xmlns:p14="http://schemas.microsoft.com/office/powerpoint/2010/main" val="809148830"/>
+        <p14:creationId xmlns:p14="http://schemas.microsoft.com/office/powerpoint/2010/main" val="904173607"/>
       </p:ext>
     </p:extLst>
   </p:cSld>
   <p:clrMapOvr>
     <a:masterClrMapping/>
   </p:clrMapOvr>
+  <mc:AlternateContent xmlns:mc="http://schemas.openxmlformats.org/markup-compatibility/2006">
+    <mc:Choice xmlns:p14="http://schemas.microsoft.com/office/powerpoint/2010/main" Requires="p14">
+      <p:transition spd="slow" p14:dur="2000"/>
+    </mc:Choice>
+    <mc:Fallback>
+      <p:transition spd="slow"/>
+    </mc:Fallback>
+  </mc:AlternateContent>
+  <p:timing>
+    <p:tnLst>
+      <p:par>
+        <p:cTn id="1" dur="indefinite" restart="never" nodeType="tmRoot"/>
+      </p:par>
+    </p:tnLst>
+  </p:timing>
 </p:sld>
 </file>
 
@@ -6178,6 +6950,719 @@
       </p:grpSpPr>
       <p:sp>
         <p:nvSpPr>
+          <p:cNvPr id="2" name="Title 1"/>
+          <p:cNvSpPr>
+            <a:spLocks noGrp="1"/>
+          </p:cNvSpPr>
+          <p:nvPr>
+            <p:ph type="title"/>
+          </p:nvPr>
+        </p:nvSpPr>
+        <p:spPr/>
+        <p:txBody>
+          <a:bodyPr/>
+          <a:lstStyle/>
+          <a:p>
+            <a:r>
+              <a:rPr lang="en-US" dirty="0"/>
+              <a:t>Raspberry PI, connected to a Full HD TV</a:t>
+            </a:r>
+          </a:p>
+        </p:txBody>
+      </p:sp>
+      <p:sp>
+        <p:nvSpPr>
+          <p:cNvPr id="4" name="Date Placeholder 3"/>
+          <p:cNvSpPr>
+            <a:spLocks noGrp="1"/>
+          </p:cNvSpPr>
+          <p:nvPr>
+            <p:ph type="dt" sz="half" idx="10"/>
+          </p:nvPr>
+        </p:nvSpPr>
+        <p:spPr/>
+        <p:txBody>
+          <a:bodyPr/>
+          <a:lstStyle/>
+          <a:p>
+            <a:r>
+              <a:rPr lang="en-US" smtClean="0"/>
+              <a:t>technology</a:t>
+            </a:r>
+            <a:endParaRPr lang="en-US" dirty="0"/>
+          </a:p>
+        </p:txBody>
+      </p:sp>
+      <p:sp>
+        <p:nvSpPr>
+          <p:cNvPr id="6" name="Slide Number Placeholder 5"/>
+          <p:cNvSpPr>
+            <a:spLocks noGrp="1"/>
+          </p:cNvSpPr>
+          <p:nvPr>
+            <p:ph type="sldNum" sz="quarter" idx="12"/>
+          </p:nvPr>
+        </p:nvSpPr>
+        <p:spPr/>
+        <p:txBody>
+          <a:bodyPr/>
+          <a:lstStyle/>
+          <a:p>
+            <a:fld id="{4B341780-68F8-4E27-B1E9-D7229E766052}" type="slidenum">
+              <a:rPr lang="en-US" smtClean="0"/>
+              <a:pPr/>
+              <a:t>5</a:t>
+            </a:fld>
+            <a:endParaRPr lang="en-US" dirty="0"/>
+          </a:p>
+        </p:txBody>
+      </p:sp>
+      <p:pic>
+        <p:nvPicPr>
+          <p:cNvPr id="8" name="Content Placeholder 7"/>
+          <p:cNvPicPr>
+            <a:picLocks noGrp="1" noChangeAspect="1"/>
+          </p:cNvPicPr>
+          <p:nvPr>
+            <p:ph idx="1"/>
+          </p:nvPr>
+        </p:nvPicPr>
+        <p:blipFill>
+          <a:blip r:embed="rId2">
+            <a:extLst>
+              <a:ext uri="{BEBA8EAE-BF5A-486C-A8C5-ECC9F3942E4B}">
+                <a14:imgProps xmlns:a14="http://schemas.microsoft.com/office/drawing/2010/main">
+                  <a14:imgLayer r:embed="rId3">
+                    <a14:imgEffect>
+                      <a14:backgroundRemoval t="3125" b="97813" l="10000" r="90000">
+                        <a14:foregroundMark x1="72250" y1="10000" x2="69417" y2="12812"/>
+                        <a14:foregroundMark x1="32333" y1="85156" x2="34750" y2="90625"/>
+                        <a14:foregroundMark x1="31667" y1="85469" x2="33167" y2="90781"/>
+                        <a14:foregroundMark x1="42500" y1="11719" x2="44167" y2="17031"/>
+                      </a14:backgroundRemoval>
+                    </a14:imgEffect>
+                  </a14:imgLayer>
+                </a14:imgProps>
+              </a:ext>
+              <a:ext uri="{28A0092B-C50C-407E-A947-70E740481C1C}">
+                <a14:useLocalDpi xmlns:a14="http://schemas.microsoft.com/office/drawing/2010/main" val="0"/>
+              </a:ext>
+            </a:extLst>
+          </a:blip>
+          <a:stretch>
+            <a:fillRect/>
+          </a:stretch>
+        </p:blipFill>
+        <p:spPr>
+          <a:xfrm>
+            <a:off x="457200" y="1438434"/>
+            <a:ext cx="8229600" cy="4389120"/>
+          </a:xfrm>
+        </p:spPr>
+      </p:pic>
+    </p:spTree>
+    <p:extLst>
+      <p:ext uri="{BB962C8B-B14F-4D97-AF65-F5344CB8AC3E}">
+        <p14:creationId xmlns:p14="http://schemas.microsoft.com/office/powerpoint/2010/main" val="809148830"/>
+      </p:ext>
+    </p:extLst>
+  </p:cSld>
+  <p:clrMapOvr>
+    <a:masterClrMapping/>
+  </p:clrMapOvr>
+  <p:timing>
+    <p:tnLst>
+      <p:par>
+        <p:cTn id="1" dur="indefinite" restart="never" nodeType="tmRoot"/>
+      </p:par>
+    </p:tnLst>
+  </p:timing>
+</p:sld>
+</file>
+
+<file path=ppt/slides/slide6.xml><?xml version="1.0" encoding="utf-8"?>
+<p:sld xmlns:a="http://schemas.openxmlformats.org/drawingml/2006/main" xmlns:r="http://schemas.openxmlformats.org/officeDocument/2006/relationships" xmlns:p="http://schemas.openxmlformats.org/presentationml/2006/main">
+  <p:cSld>
+    <p:spTree>
+      <p:nvGrpSpPr>
+        <p:cNvPr id="1" name=""/>
+        <p:cNvGrpSpPr/>
+        <p:nvPr/>
+      </p:nvGrpSpPr>
+      <p:grpSpPr>
+        <a:xfrm>
+          <a:off x="0" y="0"/>
+          <a:ext cx="0" cy="0"/>
+          <a:chOff x="0" y="0"/>
+          <a:chExt cx="0" cy="0"/>
+        </a:xfrm>
+      </p:grpSpPr>
+      <p:sp>
+        <p:nvSpPr>
+          <p:cNvPr id="2" name="Title 1"/>
+          <p:cNvSpPr>
+            <a:spLocks noGrp="1"/>
+          </p:cNvSpPr>
+          <p:nvPr>
+            <p:ph type="title"/>
+          </p:nvPr>
+        </p:nvSpPr>
+        <p:spPr/>
+        <p:txBody>
+          <a:bodyPr/>
+          <a:lstStyle/>
+          <a:p>
+            <a:r>
+              <a:rPr lang="en-US" dirty="0"/>
+              <a:t>On PI, a service, scraps data from MPK website every </a:t>
+            </a:r>
+            <a:r>
+              <a:rPr lang="en-US" dirty="0" smtClean="0"/>
+              <a:t>day</a:t>
+            </a:r>
+            <a:endParaRPr lang="en-US" dirty="0"/>
+          </a:p>
+        </p:txBody>
+      </p:sp>
+      <p:pic>
+        <p:nvPicPr>
+          <p:cNvPr id="10" name="Content Placeholder 9"/>
+          <p:cNvPicPr>
+            <a:picLocks noGrp="1" noChangeAspect="1"/>
+          </p:cNvPicPr>
+          <p:nvPr>
+            <p:ph idx="1"/>
+          </p:nvPr>
+        </p:nvPicPr>
+        <p:blipFill rotWithShape="1">
+          <a:blip r:embed="rId2">
+            <a:extLst>
+              <a:ext uri="{28A0092B-C50C-407E-A947-70E740481C1C}">
+                <a14:useLocalDpi xmlns:a14="http://schemas.microsoft.com/office/drawing/2010/main" val="0"/>
+              </a:ext>
+            </a:extLst>
+          </a:blip>
+          <a:srcRect l="15079" t="12907" r="24427" b="6200"/>
+          <a:stretch/>
+        </p:blipFill>
+        <p:spPr>
+          <a:xfrm>
+            <a:off x="943428" y="1306286"/>
+            <a:ext cx="6676571" cy="4608858"/>
+          </a:xfrm>
+        </p:spPr>
+      </p:pic>
+      <p:sp>
+        <p:nvSpPr>
+          <p:cNvPr id="4" name="Date Placeholder 3"/>
+          <p:cNvSpPr>
+            <a:spLocks noGrp="1"/>
+          </p:cNvSpPr>
+          <p:nvPr>
+            <p:ph type="dt" sz="half" idx="10"/>
+          </p:nvPr>
+        </p:nvSpPr>
+        <p:spPr/>
+        <p:txBody>
+          <a:bodyPr/>
+          <a:lstStyle/>
+          <a:p>
+            <a:r>
+              <a:rPr lang="en-US" smtClean="0"/>
+              <a:t>technology</a:t>
+            </a:r>
+            <a:endParaRPr lang="en-US" dirty="0"/>
+          </a:p>
+        </p:txBody>
+      </p:sp>
+      <p:sp>
+        <p:nvSpPr>
+          <p:cNvPr id="5" name="Footer Placeholder 4"/>
+          <p:cNvSpPr>
+            <a:spLocks noGrp="1"/>
+          </p:cNvSpPr>
+          <p:nvPr>
+            <p:ph type="ftr" sz="quarter" idx="11"/>
+          </p:nvPr>
+        </p:nvSpPr>
+        <p:spPr/>
+        <p:txBody>
+          <a:bodyPr/>
+          <a:lstStyle/>
+          <a:p>
+            <a:r>
+              <a:rPr lang="en-US" smtClean="0"/>
+              <a:t>confidential</a:t>
+            </a:r>
+            <a:endParaRPr lang="en-US" dirty="0"/>
+          </a:p>
+        </p:txBody>
+      </p:sp>
+      <p:sp>
+        <p:nvSpPr>
+          <p:cNvPr id="6" name="Slide Number Placeholder 5"/>
+          <p:cNvSpPr>
+            <a:spLocks noGrp="1"/>
+          </p:cNvSpPr>
+          <p:nvPr>
+            <p:ph type="sldNum" sz="quarter" idx="12"/>
+          </p:nvPr>
+        </p:nvSpPr>
+        <p:spPr/>
+        <p:txBody>
+          <a:bodyPr/>
+          <a:lstStyle/>
+          <a:p>
+            <a:fld id="{4B341780-68F8-4E27-B1E9-D7229E766052}" type="slidenum">
+              <a:rPr lang="en-US" smtClean="0"/>
+              <a:pPr/>
+              <a:t>6</a:t>
+            </a:fld>
+            <a:endParaRPr lang="en-US" dirty="0"/>
+          </a:p>
+        </p:txBody>
+      </p:sp>
+    </p:spTree>
+    <p:extLst>
+      <p:ext uri="{BB962C8B-B14F-4D97-AF65-F5344CB8AC3E}">
+        <p14:creationId xmlns:p14="http://schemas.microsoft.com/office/powerpoint/2010/main" val="1421287478"/>
+      </p:ext>
+    </p:extLst>
+  </p:cSld>
+  <p:clrMapOvr>
+    <a:masterClrMapping/>
+  </p:clrMapOvr>
+  <p:timing>
+    <p:tnLst>
+      <p:par>
+        <p:cTn id="1" dur="indefinite" restart="never" nodeType="tmRoot"/>
+      </p:par>
+    </p:tnLst>
+  </p:timing>
+</p:sld>
+</file>
+
+<file path=ppt/slides/slide7.xml><?xml version="1.0" encoding="utf-8"?>
+<p:sld xmlns:a="http://schemas.openxmlformats.org/drawingml/2006/main" xmlns:r="http://schemas.openxmlformats.org/officeDocument/2006/relationships" xmlns:p="http://schemas.openxmlformats.org/presentationml/2006/main">
+  <p:cSld>
+    <p:spTree>
+      <p:nvGrpSpPr>
+        <p:cNvPr id="1" name=""/>
+        <p:cNvGrpSpPr/>
+        <p:nvPr/>
+      </p:nvGrpSpPr>
+      <p:grpSpPr>
+        <a:xfrm>
+          <a:off x="0" y="0"/>
+          <a:ext cx="0" cy="0"/>
+          <a:chOff x="0" y="0"/>
+          <a:chExt cx="0" cy="0"/>
+        </a:xfrm>
+      </p:grpSpPr>
+      <p:sp>
+        <p:nvSpPr>
+          <p:cNvPr id="2" name="Title 1"/>
+          <p:cNvSpPr>
+            <a:spLocks noGrp="1"/>
+          </p:cNvSpPr>
+          <p:nvPr>
+            <p:ph type="title"/>
+          </p:nvPr>
+        </p:nvSpPr>
+        <p:spPr/>
+        <p:txBody>
+          <a:bodyPr/>
+          <a:lstStyle/>
+          <a:p>
+            <a:r>
+              <a:rPr lang="en-US" dirty="0" smtClean="0"/>
+              <a:t>REST </a:t>
+            </a:r>
+            <a:r>
+              <a:rPr lang="en-US" dirty="0"/>
+              <a:t>interface for </a:t>
+            </a:r>
+            <a:r>
+              <a:rPr lang="en-US" dirty="0" smtClean="0"/>
+              <a:t>clients</a:t>
+            </a:r>
+            <a:endParaRPr lang="en-US" dirty="0"/>
+          </a:p>
+        </p:txBody>
+      </p:sp>
+      <p:sp>
+        <p:nvSpPr>
+          <p:cNvPr id="4" name="Date Placeholder 3"/>
+          <p:cNvSpPr>
+            <a:spLocks noGrp="1"/>
+          </p:cNvSpPr>
+          <p:nvPr>
+            <p:ph type="dt" sz="half" idx="10"/>
+          </p:nvPr>
+        </p:nvSpPr>
+        <p:spPr/>
+        <p:txBody>
+          <a:bodyPr/>
+          <a:lstStyle/>
+          <a:p>
+            <a:r>
+              <a:rPr lang="en-US" smtClean="0"/>
+              <a:t>technology</a:t>
+            </a:r>
+            <a:endParaRPr lang="en-US" dirty="0"/>
+          </a:p>
+        </p:txBody>
+      </p:sp>
+      <p:sp>
+        <p:nvSpPr>
+          <p:cNvPr id="5" name="Footer Placeholder 4"/>
+          <p:cNvSpPr>
+            <a:spLocks noGrp="1"/>
+          </p:cNvSpPr>
+          <p:nvPr>
+            <p:ph type="ftr" sz="quarter" idx="11"/>
+          </p:nvPr>
+        </p:nvSpPr>
+        <p:spPr/>
+        <p:txBody>
+          <a:bodyPr/>
+          <a:lstStyle/>
+          <a:p>
+            <a:r>
+              <a:rPr lang="en-US" smtClean="0"/>
+              <a:t>confidential</a:t>
+            </a:r>
+            <a:endParaRPr lang="en-US" dirty="0"/>
+          </a:p>
+        </p:txBody>
+      </p:sp>
+      <p:sp>
+        <p:nvSpPr>
+          <p:cNvPr id="6" name="Slide Number Placeholder 5"/>
+          <p:cNvSpPr>
+            <a:spLocks noGrp="1"/>
+          </p:cNvSpPr>
+          <p:nvPr>
+            <p:ph type="sldNum" sz="quarter" idx="12"/>
+          </p:nvPr>
+        </p:nvSpPr>
+        <p:spPr/>
+        <p:txBody>
+          <a:bodyPr/>
+          <a:lstStyle/>
+          <a:p>
+            <a:fld id="{4B341780-68F8-4E27-B1E9-D7229E766052}" type="slidenum">
+              <a:rPr lang="en-US" smtClean="0"/>
+              <a:pPr/>
+              <a:t>7</a:t>
+            </a:fld>
+            <a:endParaRPr lang="en-US" dirty="0"/>
+          </a:p>
+        </p:txBody>
+      </p:sp>
+      <p:pic>
+        <p:nvPicPr>
+          <p:cNvPr id="3074" name="Picture 2"/>
+          <p:cNvPicPr>
+            <a:picLocks noChangeAspect="1" noChangeArrowheads="1"/>
+          </p:cNvPicPr>
+          <p:nvPr/>
+        </p:nvPicPr>
+        <p:blipFill>
+          <a:blip r:embed="rId2">
+            <a:extLst>
+              <a:ext uri="{28A0092B-C50C-407E-A947-70E740481C1C}">
+                <a14:useLocalDpi xmlns:a14="http://schemas.microsoft.com/office/drawing/2010/main" val="0"/>
+              </a:ext>
+            </a:extLst>
+          </a:blip>
+          <a:srcRect/>
+          <a:stretch>
+            <a:fillRect/>
+          </a:stretch>
+        </p:blipFill>
+        <p:spPr bwMode="auto">
+          <a:xfrm>
+            <a:off x="522513" y="1275034"/>
+            <a:ext cx="7503703" cy="4545195"/>
+          </a:xfrm>
+          <a:prstGeom prst="rect">
+            <a:avLst/>
+          </a:prstGeom>
+          <a:noFill/>
+          <a:ln>
+            <a:noFill/>
+          </a:ln>
+          <a:effectLst/>
+          <a:extLst>
+            <a:ext uri="{909E8E84-426E-40DD-AFC4-6F175D3DCCD1}">
+              <a14:hiddenFill xmlns:a14="http://schemas.microsoft.com/office/drawing/2010/main">
+                <a:solidFill>
+                  <a:schemeClr val="accent1"/>
+                </a:solidFill>
+              </a14:hiddenFill>
+            </a:ext>
+            <a:ext uri="{91240B29-F687-4F45-9708-019B960494DF}">
+              <a14:hiddenLine xmlns:a14="http://schemas.microsoft.com/office/drawing/2010/main" w="9525">
+                <a:solidFill>
+                  <a:schemeClr val="tx1"/>
+                </a:solidFill>
+                <a:miter lim="800000"/>
+                <a:headEnd/>
+                <a:tailEnd/>
+              </a14:hiddenLine>
+            </a:ext>
+            <a:ext uri="{AF507438-7753-43E0-B8FC-AC1667EBCBE1}">
+              <a14:hiddenEffects xmlns:a14="http://schemas.microsoft.com/office/drawing/2010/main">
+                <a:effectLst>
+                  <a:outerShdw dist="35921" dir="2700000" algn="ctr" rotWithShape="0">
+                    <a:schemeClr val="bg2"/>
+                  </a:outerShdw>
+                </a:effectLst>
+              </a14:hiddenEffects>
+            </a:ext>
+          </a:extLst>
+        </p:spPr>
+      </p:pic>
+    </p:spTree>
+    <p:extLst>
+      <p:ext uri="{BB962C8B-B14F-4D97-AF65-F5344CB8AC3E}">
+        <p14:creationId xmlns:p14="http://schemas.microsoft.com/office/powerpoint/2010/main" val="2257769785"/>
+      </p:ext>
+    </p:extLst>
+  </p:cSld>
+  <p:clrMapOvr>
+    <a:masterClrMapping/>
+  </p:clrMapOvr>
+  <p:timing>
+    <p:tnLst>
+      <p:par>
+        <p:cTn id="1" dur="indefinite" restart="never" nodeType="tmRoot"/>
+      </p:par>
+    </p:tnLst>
+  </p:timing>
+</p:sld>
+</file>
+
+<file path=ppt/slides/slide8.xml><?xml version="1.0" encoding="utf-8"?>
+<p:sld xmlns:a="http://schemas.openxmlformats.org/drawingml/2006/main" xmlns:r="http://schemas.openxmlformats.org/officeDocument/2006/relationships" xmlns:p="http://schemas.openxmlformats.org/presentationml/2006/main">
+  <p:cSld>
+    <p:spTree>
+      <p:nvGrpSpPr>
+        <p:cNvPr id="1" name=""/>
+        <p:cNvGrpSpPr/>
+        <p:nvPr/>
+      </p:nvGrpSpPr>
+      <p:grpSpPr>
+        <a:xfrm>
+          <a:off x="0" y="0"/>
+          <a:ext cx="0" cy="0"/>
+          <a:chOff x="0" y="0"/>
+          <a:chExt cx="0" cy="0"/>
+        </a:xfrm>
+      </p:grpSpPr>
+      <p:sp>
+        <p:nvSpPr>
+          <p:cNvPr id="2" name="Title 1"/>
+          <p:cNvSpPr>
+            <a:spLocks noGrp="1"/>
+          </p:cNvSpPr>
+          <p:nvPr>
+            <p:ph type="title"/>
+          </p:nvPr>
+        </p:nvSpPr>
+        <p:spPr/>
+        <p:txBody>
+          <a:bodyPr/>
+          <a:lstStyle/>
+          <a:p>
+            <a:r>
+              <a:rPr lang="en-US" dirty="0"/>
+              <a:t>HTML used for presentation layer, showing stops near </a:t>
+            </a:r>
+            <a:r>
+              <a:rPr lang="en-US" dirty="0" smtClean="0"/>
+              <a:t>BUMA</a:t>
+            </a:r>
+            <a:endParaRPr lang="en-US" dirty="0"/>
+          </a:p>
+        </p:txBody>
+      </p:sp>
+      <p:sp>
+        <p:nvSpPr>
+          <p:cNvPr id="4" name="Date Placeholder 3"/>
+          <p:cNvSpPr>
+            <a:spLocks noGrp="1"/>
+          </p:cNvSpPr>
+          <p:nvPr>
+            <p:ph type="dt" sz="half" idx="10"/>
+          </p:nvPr>
+        </p:nvSpPr>
+        <p:spPr/>
+        <p:txBody>
+          <a:bodyPr/>
+          <a:lstStyle/>
+          <a:p>
+            <a:r>
+              <a:rPr lang="en-US" smtClean="0"/>
+              <a:t>technology</a:t>
+            </a:r>
+            <a:endParaRPr lang="en-US" dirty="0"/>
+          </a:p>
+        </p:txBody>
+      </p:sp>
+      <p:sp>
+        <p:nvSpPr>
+          <p:cNvPr id="5" name="Footer Placeholder 4"/>
+          <p:cNvSpPr>
+            <a:spLocks noGrp="1"/>
+          </p:cNvSpPr>
+          <p:nvPr>
+            <p:ph type="ftr" sz="quarter" idx="11"/>
+          </p:nvPr>
+        </p:nvSpPr>
+        <p:spPr/>
+        <p:txBody>
+          <a:bodyPr/>
+          <a:lstStyle/>
+          <a:p>
+            <a:r>
+              <a:rPr lang="en-US" smtClean="0"/>
+              <a:t>confidential</a:t>
+            </a:r>
+            <a:endParaRPr lang="en-US" dirty="0"/>
+          </a:p>
+        </p:txBody>
+      </p:sp>
+      <p:sp>
+        <p:nvSpPr>
+          <p:cNvPr id="6" name="Slide Number Placeholder 5"/>
+          <p:cNvSpPr>
+            <a:spLocks noGrp="1"/>
+          </p:cNvSpPr>
+          <p:nvPr>
+            <p:ph type="sldNum" sz="quarter" idx="12"/>
+          </p:nvPr>
+        </p:nvSpPr>
+        <p:spPr/>
+        <p:txBody>
+          <a:bodyPr/>
+          <a:lstStyle/>
+          <a:p>
+            <a:fld id="{4B341780-68F8-4E27-B1E9-D7229E766052}" type="slidenum">
+              <a:rPr lang="en-US" smtClean="0"/>
+              <a:pPr/>
+              <a:t>8</a:t>
+            </a:fld>
+            <a:endParaRPr lang="en-US" dirty="0"/>
+          </a:p>
+        </p:txBody>
+      </p:sp>
+      <p:pic>
+        <p:nvPicPr>
+          <p:cNvPr id="7" name="Picture 2"/>
+          <p:cNvPicPr>
+            <a:picLocks noGrp="1" noChangeAspect="1" noChangeArrowheads="1"/>
+          </p:cNvPicPr>
+          <p:nvPr>
+            <p:ph idx="1"/>
+          </p:nvPr>
+        </p:nvPicPr>
+        <p:blipFill>
+          <a:blip r:embed="rId2">
+            <a:extLst>
+              <a:ext uri="{28A0092B-C50C-407E-A947-70E740481C1C}">
+                <a14:useLocalDpi xmlns:a14="http://schemas.microsoft.com/office/drawing/2010/main" val="0"/>
+              </a:ext>
+            </a:extLst>
+          </a:blip>
+          <a:srcRect/>
+          <a:stretch>
+            <a:fillRect/>
+          </a:stretch>
+        </p:blipFill>
+        <p:spPr bwMode="auto">
+          <a:xfrm>
+            <a:off x="457200" y="1300436"/>
+            <a:ext cx="8229600" cy="4665116"/>
+          </a:xfrm>
+          <a:prstGeom prst="rect">
+            <a:avLst/>
+          </a:prstGeom>
+          <a:noFill/>
+          <a:ln>
+            <a:noFill/>
+          </a:ln>
+          <a:effectLst/>
+          <a:extLst>
+            <a:ext uri="{909E8E84-426E-40DD-AFC4-6F175D3DCCD1}">
+              <a14:hiddenFill xmlns:a14="http://schemas.microsoft.com/office/drawing/2010/main">
+                <a:solidFill>
+                  <a:schemeClr val="accent1"/>
+                </a:solidFill>
+              </a14:hiddenFill>
+            </a:ext>
+            <a:ext uri="{91240B29-F687-4F45-9708-019B960494DF}">
+              <a14:hiddenLine xmlns:a14="http://schemas.microsoft.com/office/drawing/2010/main" w="9525">
+                <a:solidFill>
+                  <a:schemeClr val="tx1"/>
+                </a:solidFill>
+                <a:miter lim="800000"/>
+                <a:headEnd/>
+                <a:tailEnd/>
+              </a14:hiddenLine>
+            </a:ext>
+            <a:ext uri="{AF507438-7753-43E0-B8FC-AC1667EBCBE1}">
+              <a14:hiddenEffects xmlns:a14="http://schemas.microsoft.com/office/drawing/2010/main">
+                <a:effectLst>
+                  <a:outerShdw dist="35921" dir="2700000" algn="ctr" rotWithShape="0">
+                    <a:schemeClr val="bg2"/>
+                  </a:outerShdw>
+                </a:effectLst>
+              </a14:hiddenEffects>
+            </a:ext>
+          </a:extLst>
+        </p:spPr>
+      </p:pic>
+    </p:spTree>
+    <p:extLst>
+      <p:ext uri="{BB962C8B-B14F-4D97-AF65-F5344CB8AC3E}">
+        <p14:creationId xmlns:p14="http://schemas.microsoft.com/office/powerpoint/2010/main" val="3902026067"/>
+      </p:ext>
+    </p:extLst>
+  </p:cSld>
+  <p:clrMapOvr>
+    <a:masterClrMapping/>
+  </p:clrMapOvr>
+  <p:timing>
+    <p:tnLst>
+      <p:par>
+        <p:cTn id="1" dur="indefinite" restart="never" nodeType="tmRoot"/>
+      </p:par>
+    </p:tnLst>
+  </p:timing>
+</p:sld>
+</file>
+
+<file path=ppt/slides/slide9.xml><?xml version="1.0" encoding="utf-8"?>
+<p:sld xmlns:a="http://schemas.openxmlformats.org/drawingml/2006/main" xmlns:r="http://schemas.openxmlformats.org/officeDocument/2006/relationships" xmlns:p="http://schemas.openxmlformats.org/presentationml/2006/main">
+  <p:cSld>
+    <p:spTree>
+      <p:nvGrpSpPr>
+        <p:cNvPr id="1" name=""/>
+        <p:cNvGrpSpPr/>
+        <p:nvPr/>
+      </p:nvGrpSpPr>
+      <p:grpSpPr>
+        <a:xfrm>
+          <a:off x="0" y="0"/>
+          <a:ext cx="0" cy="0"/>
+          <a:chOff x="0" y="0"/>
+          <a:chExt cx="0" cy="0"/>
+        </a:xfrm>
+      </p:grpSpPr>
+      <p:sp>
+        <p:nvSpPr>
           <p:cNvPr id="7" name="Title 6"/>
           <p:cNvSpPr>
             <a:spLocks noGrp="1"/>
@@ -6197,8 +7682,19 @@
           <a:lstStyle/>
           <a:p>
             <a:r>
-              <a:rPr lang="en-US" noProof="0" dirty="0" smtClean="0"/>
-              <a:t>Questions?</a:t>
+              <a:rPr lang="en-US" b="1" dirty="0" smtClean="0"/>
+              <a:t>Team Tempo</a:t>
+            </a:r>
+            <a:r>
+              <a:rPr lang="en-US" dirty="0" smtClean="0"/>
+              <a:t/>
+            </a:r>
+            <a:br>
+              <a:rPr lang="en-US" dirty="0" smtClean="0"/>
+            </a:br>
+            <a:r>
+              <a:rPr lang="en-US" dirty="0" smtClean="0"/>
+              <a:t>TV-Tram</a:t>
             </a:r>
             <a:endParaRPr lang="en-US" noProof="0" dirty="0"/>
           </a:p>
@@ -6219,7 +7715,11 @@
           <a:bodyPr/>
           <a:lstStyle/>
           <a:p>
-            <a:endParaRPr lang="en-US"/>
+            <a:r>
+              <a:rPr lang="en-US" dirty="0"/>
+              <a:t>Liked? Vote it!</a:t>
+            </a:r>
+            <a:endParaRPr lang="en-US" dirty="0"/>
           </a:p>
         </p:txBody>
       </p:sp>
@@ -6248,12 +7748,12 @@
       </p:sp>
       <p:sp>
         <p:nvSpPr>
-          <p:cNvPr id="5" name="Footer Placeholder 4"/>
-          <p:cNvSpPr>
-            <a:spLocks noGrp="1"/>
-          </p:cNvSpPr>
-          <p:nvPr>
-            <p:ph type="ftr" sz="quarter" idx="11"/>
+          <p:cNvPr id="6" name="Slide Number Placeholder 5"/>
+          <p:cNvSpPr>
+            <a:spLocks noGrp="1"/>
+          </p:cNvSpPr>
+          <p:nvPr>
+            <p:ph type="sldNum" sz="quarter" idx="12"/>
           </p:nvPr>
         </p:nvSpPr>
         <p:spPr/>
@@ -6261,33 +7761,10 @@
           <a:bodyPr/>
           <a:lstStyle/>
           <a:p>
-            <a:r>
-              <a:rPr lang="en-US" smtClean="0"/>
-              <a:t>confidential</a:t>
-            </a:r>
-            <a:endParaRPr lang="en-US"/>
-          </a:p>
-        </p:txBody>
-      </p:sp>
-      <p:sp>
-        <p:nvSpPr>
-          <p:cNvPr id="6" name="Slide Number Placeholder 5"/>
-          <p:cNvSpPr>
-            <a:spLocks noGrp="1"/>
-          </p:cNvSpPr>
-          <p:nvPr>
-            <p:ph type="sldNum" sz="quarter" idx="12"/>
-          </p:nvPr>
-        </p:nvSpPr>
-        <p:spPr/>
-        <p:txBody>
-          <a:bodyPr/>
-          <a:lstStyle/>
-          <a:p>
             <a:fld id="{4B341780-68F8-4E27-B1E9-D7229E766052}" type="slidenum">
               <a:rPr lang="en-US" smtClean="0"/>
               <a:pPr/>
-              <a:t>5</a:t>
+              <a:t>9</a:t>
             </a:fld>
             <a:endParaRPr lang="en-US"/>
           </a:p>
@@ -6999,23 +8476,6 @@
 </file>
 
 <file path=customXml/item1.xml><?xml version="1.0" encoding="utf-8"?>
-<p:properties xmlns:p="http://schemas.microsoft.com/office/2006/metadata/properties" xmlns:xsi="http://www.w3.org/2001/XMLSchema-instance">
-  <documentManagement>
-    <Data_x0020_Classification xmlns="9b4ca1ea-5fde-4d6d-bb12-7bca66b28d40">Private</Data_x0020_Classification>
-  </documentManagement>
-</p:properties>
-</file>
-
-<file path=customXml/item2.xml><?xml version="1.0" encoding="utf-8"?>
-<?mso-contentType ?>
-<FormTemplates xmlns="http://schemas.microsoft.com/sharepoint/v3/contenttype/forms">
-  <Display>DocumentLibraryForm</Display>
-  <Edit>DocumentLibraryForm</Edit>
-  <New>DocumentLibraryForm</New>
-</FormTemplates>
-</file>
-
-<file path=customXml/item3.xml><?xml version="1.0" encoding="utf-8"?>
 <ct:contentTypeSchema xmlns:ct="http://schemas.microsoft.com/office/2006/metadata/contentType" xmlns:ma="http://schemas.microsoft.com/office/2006/metadata/properties/metaAttributes" ct:_="" ma:_="" ma:contentTypeName="Document" ma:contentTypeID="0x010100DB5DA965ECAAD541B59145D8795FEC80" ma:contentTypeVersion="0" ma:contentTypeDescription="Create a new document." ma:contentTypeScope="" ma:versionID="206a14c534ac47e7d7e73873af344d96">
   <xsd:schema xmlns:xsd="http://www.w3.org/2001/XMLSchema" xmlns:p="http://schemas.microsoft.com/office/2006/metadata/properties" xmlns:ns2="9b4ca1ea-5fde-4d6d-bb12-7bca66b28d40" targetNamespace="http://schemas.microsoft.com/office/2006/metadata/properties" ma:root="true" ma:fieldsID="03bfca4280fcbdaf3123c8956d64ace9" ns2:_="">
     <xsd:import namespace="9b4ca1ea-5fde-4d6d-bb12-7bca66b28d40"/>
@@ -7079,30 +8539,24 @@
 </ct:contentTypeSchema>
 </file>
 
-<file path=customXml/itemProps1.xml><?xml version="1.0" encoding="utf-8"?>
-<ds:datastoreItem xmlns:ds="http://schemas.openxmlformats.org/officeDocument/2006/customXml" ds:itemID="{B952720F-F700-48FD-AFE9-F628657BBE4C}">
-  <ds:schemaRefs>
-    <ds:schemaRef ds:uri="http://purl.org/dc/dcmitype/"/>
-    <ds:schemaRef ds:uri="http://schemas.microsoft.com/office/2006/metadata/properties"/>
-    <ds:schemaRef ds:uri="http://schemas.microsoft.com/office/2006/documentManagement/types"/>
-    <ds:schemaRef ds:uri="http://www.w3.org/XML/1998/namespace"/>
-    <ds:schemaRef ds:uri="http://purl.org/dc/elements/1.1/"/>
-    <ds:schemaRef ds:uri="http://purl.org/dc/terms/"/>
-    <ds:schemaRef ds:uri="http://schemas.openxmlformats.org/package/2006/metadata/core-properties"/>
-    <ds:schemaRef ds:uri="9b4ca1ea-5fde-4d6d-bb12-7bca66b28d40"/>
-  </ds:schemaRefs>
-</ds:datastoreItem>
+<file path=customXml/item2.xml><?xml version="1.0" encoding="utf-8"?>
+<?mso-contentType ?>
+<FormTemplates xmlns="http://schemas.microsoft.com/sharepoint/v3/contenttype/forms">
+  <Display>DocumentLibraryForm</Display>
+  <Edit>DocumentLibraryForm</Edit>
+  <New>DocumentLibraryForm</New>
+</FormTemplates>
 </file>
 
-<file path=customXml/itemProps2.xml><?xml version="1.0" encoding="utf-8"?>
-<ds:datastoreItem xmlns:ds="http://schemas.openxmlformats.org/officeDocument/2006/customXml" ds:itemID="{980C73DB-1D69-49E7-A585-DEFFA75A31F5}">
-  <ds:schemaRefs>
-    <ds:schemaRef ds:uri="http://schemas.microsoft.com/sharepoint/v3/contenttype/forms"/>
-  </ds:schemaRefs>
-</ds:datastoreItem>
+<file path=customXml/item3.xml><?xml version="1.0" encoding="utf-8"?>
+<p:properties xmlns:p="http://schemas.microsoft.com/office/2006/metadata/properties" xmlns:xsi="http://www.w3.org/2001/XMLSchema-instance">
+  <documentManagement>
+    <Data_x0020_Classification xmlns="9b4ca1ea-5fde-4d6d-bb12-7bca66b28d40">Private</Data_x0020_Classification>
+  </documentManagement>
+</p:properties>
 </file>
 
-<file path=customXml/itemProps3.xml><?xml version="1.0" encoding="utf-8"?>
+<file path=customXml/itemProps1.xml><?xml version="1.0" encoding="utf-8"?>
 <ds:datastoreItem xmlns:ds="http://schemas.openxmlformats.org/officeDocument/2006/customXml" ds:itemID="{D640BD1A-3759-499B-B22B-EDE87723077F}">
   <ds:schemaRefs>
     <ds:schemaRef ds:uri="http://schemas.microsoft.com/office/2006/metadata/contentType"/>
@@ -7117,4 +8571,27 @@
     <ds:schemaRef ds:uri="http://schemas.microsoft.com/office/internal/2005/internalDocumentation"/>
   </ds:schemaRefs>
 </ds:datastoreItem>
+</file>
+
+<file path=customXml/itemProps2.xml><?xml version="1.0" encoding="utf-8"?>
+<ds:datastoreItem xmlns:ds="http://schemas.openxmlformats.org/officeDocument/2006/customXml" ds:itemID="{980C73DB-1D69-49E7-A585-DEFFA75A31F5}">
+  <ds:schemaRefs>
+    <ds:schemaRef ds:uri="http://schemas.microsoft.com/sharepoint/v3/contenttype/forms"/>
+  </ds:schemaRefs>
+</ds:datastoreItem>
+</file>
+
+<file path=customXml/itemProps3.xml><?xml version="1.0" encoding="utf-8"?>
+<ds:datastoreItem xmlns:ds="http://schemas.openxmlformats.org/officeDocument/2006/customXml" ds:itemID="{B952720F-F700-48FD-AFE9-F628657BBE4C}">
+  <ds:schemaRefs>
+    <ds:schemaRef ds:uri="http://www.w3.org/XML/1998/namespace"/>
+    <ds:schemaRef ds:uri="http://purl.org/dc/dcmitype/"/>
+    <ds:schemaRef ds:uri="9b4ca1ea-5fde-4d6d-bb12-7bca66b28d40"/>
+    <ds:schemaRef ds:uri="http://purl.org/dc/elements/1.1/"/>
+    <ds:schemaRef ds:uri="http://schemas.microsoft.com/office/2006/documentManagement/types"/>
+    <ds:schemaRef ds:uri="http://schemas.microsoft.com/office/2006/metadata/properties"/>
+    <ds:schemaRef ds:uri="http://schemas.openxmlformats.org/package/2006/metadata/core-properties"/>
+    <ds:schemaRef ds:uri="http://purl.org/dc/terms/"/>
+  </ds:schemaRefs>
+</ds:datastoreItem>
 </file>
</xml_diff>